<commit_message>
Előnyök, hátrányok és egyéb fejlesztések
</commit_message>
<xml_diff>
--- a/Vízesés modell.pptx
+++ b/Vízesés modell.pptx
@@ -8,9 +8,10 @@
     <p:sldId id="256" r:id="rId2"/>
     <p:sldId id="258" r:id="rId3"/>
     <p:sldId id="257" r:id="rId4"/>
-    <p:sldId id="259" r:id="rId5"/>
-    <p:sldId id="260" r:id="rId6"/>
-    <p:sldId id="261" r:id="rId7"/>
+    <p:sldId id="260" r:id="rId5"/>
+    <p:sldId id="262" r:id="rId6"/>
+    <p:sldId id="259" r:id="rId7"/>
+    <p:sldId id="263" r:id="rId8"/>
   </p:sldIdLst>
   <p:sldSz cx="12192000" cy="6858000"/>
   <p:notesSz cx="6858000" cy="9144000"/>
@@ -109,7 +110,2968 @@
       </a:defRPr>
     </a:lvl9pPr>
   </p:defaultTextStyle>
+  <p:extLst>
+    <p:ext uri="{EFAFB233-063F-42B5-8137-9DF3F51BA10A}">
+      <p15:sldGuideLst xmlns:p15="http://schemas.microsoft.com/office/powerpoint/2012/main"/>
+    </p:ext>
+  </p:extLst>
 </p:presentation>
+</file>
+
+<file path=ppt/diagrams/colors1.xml><?xml version="1.0" encoding="utf-8"?>
+<dgm:colorsDef xmlns:dgm="http://schemas.openxmlformats.org/drawingml/2006/diagram" xmlns:a="http://schemas.openxmlformats.org/drawingml/2006/main" uniqueId="urn:microsoft.com/office/officeart/2005/8/colors/accent1_2">
+  <dgm:title val=""/>
+  <dgm:desc val=""/>
+  <dgm:catLst>
+    <dgm:cat type="accent1" pri="11200"/>
+  </dgm:catLst>
+  <dgm:styleLbl name="node0">
+    <dgm:fillClrLst meth="repeat">
+      <a:schemeClr val="accent1"/>
+    </dgm:fillClrLst>
+    <dgm:linClrLst meth="repeat">
+      <a:schemeClr val="lt1"/>
+    </dgm:linClrLst>
+    <dgm:effectClrLst/>
+    <dgm:txLinClrLst/>
+    <dgm:txFillClrLst/>
+    <dgm:txEffectClrLst/>
+  </dgm:styleLbl>
+  <dgm:styleLbl name="alignNode1">
+    <dgm:fillClrLst meth="repeat">
+      <a:schemeClr val="accent1"/>
+    </dgm:fillClrLst>
+    <dgm:linClrLst meth="repeat">
+      <a:schemeClr val="accent1"/>
+    </dgm:linClrLst>
+    <dgm:effectClrLst/>
+    <dgm:txLinClrLst/>
+    <dgm:txFillClrLst/>
+    <dgm:txEffectClrLst/>
+  </dgm:styleLbl>
+  <dgm:styleLbl name="node1">
+    <dgm:fillClrLst meth="repeat">
+      <a:schemeClr val="accent1"/>
+    </dgm:fillClrLst>
+    <dgm:linClrLst meth="repeat">
+      <a:schemeClr val="lt1"/>
+    </dgm:linClrLst>
+    <dgm:effectClrLst/>
+    <dgm:txLinClrLst/>
+    <dgm:txFillClrLst/>
+    <dgm:txEffectClrLst/>
+  </dgm:styleLbl>
+  <dgm:styleLbl name="lnNode1">
+    <dgm:fillClrLst meth="repeat">
+      <a:schemeClr val="accent1"/>
+    </dgm:fillClrLst>
+    <dgm:linClrLst meth="repeat">
+      <a:schemeClr val="lt1"/>
+    </dgm:linClrLst>
+    <dgm:effectClrLst/>
+    <dgm:txLinClrLst/>
+    <dgm:txFillClrLst/>
+    <dgm:txEffectClrLst/>
+  </dgm:styleLbl>
+  <dgm:styleLbl name="vennNode1">
+    <dgm:fillClrLst meth="repeat">
+      <a:schemeClr val="accent1">
+        <a:alpha val="50000"/>
+      </a:schemeClr>
+    </dgm:fillClrLst>
+    <dgm:linClrLst meth="repeat">
+      <a:schemeClr val="lt1"/>
+    </dgm:linClrLst>
+    <dgm:effectClrLst/>
+    <dgm:txLinClrLst/>
+    <dgm:txFillClrLst/>
+    <dgm:txEffectClrLst/>
+  </dgm:styleLbl>
+  <dgm:styleLbl name="node2">
+    <dgm:fillClrLst meth="repeat">
+      <a:schemeClr val="accent1"/>
+    </dgm:fillClrLst>
+    <dgm:linClrLst meth="repeat">
+      <a:schemeClr val="lt1"/>
+    </dgm:linClrLst>
+    <dgm:effectClrLst/>
+    <dgm:txLinClrLst/>
+    <dgm:txFillClrLst/>
+    <dgm:txEffectClrLst/>
+  </dgm:styleLbl>
+  <dgm:styleLbl name="node3">
+    <dgm:fillClrLst meth="repeat">
+      <a:schemeClr val="accent1"/>
+    </dgm:fillClrLst>
+    <dgm:linClrLst meth="repeat">
+      <a:schemeClr val="lt1"/>
+    </dgm:linClrLst>
+    <dgm:effectClrLst/>
+    <dgm:txLinClrLst/>
+    <dgm:txFillClrLst/>
+    <dgm:txEffectClrLst/>
+  </dgm:styleLbl>
+  <dgm:styleLbl name="node4">
+    <dgm:fillClrLst meth="repeat">
+      <a:schemeClr val="accent1"/>
+    </dgm:fillClrLst>
+    <dgm:linClrLst meth="repeat">
+      <a:schemeClr val="lt1"/>
+    </dgm:linClrLst>
+    <dgm:effectClrLst/>
+    <dgm:txLinClrLst/>
+    <dgm:txFillClrLst/>
+    <dgm:txEffectClrLst/>
+  </dgm:styleLbl>
+  <dgm:styleLbl name="fgImgPlace1">
+    <dgm:fillClrLst meth="repeat">
+      <a:schemeClr val="accent1">
+        <a:tint val="50000"/>
+      </a:schemeClr>
+    </dgm:fillClrLst>
+    <dgm:linClrLst meth="repeat">
+      <a:schemeClr val="lt1"/>
+    </dgm:linClrLst>
+    <dgm:effectClrLst/>
+    <dgm:txLinClrLst/>
+    <dgm:txFillClrLst meth="repeat">
+      <a:schemeClr val="lt1"/>
+    </dgm:txFillClrLst>
+    <dgm:txEffectClrLst/>
+  </dgm:styleLbl>
+  <dgm:styleLbl name="alignImgPlace1">
+    <dgm:fillClrLst meth="repeat">
+      <a:schemeClr val="accent1">
+        <a:tint val="50000"/>
+      </a:schemeClr>
+    </dgm:fillClrLst>
+    <dgm:linClrLst meth="repeat">
+      <a:schemeClr val="lt1"/>
+    </dgm:linClrLst>
+    <dgm:effectClrLst/>
+    <dgm:txLinClrLst/>
+    <dgm:txFillClrLst meth="repeat">
+      <a:schemeClr val="lt1"/>
+    </dgm:txFillClrLst>
+    <dgm:txEffectClrLst/>
+  </dgm:styleLbl>
+  <dgm:styleLbl name="bgImgPlace1">
+    <dgm:fillClrLst meth="repeat">
+      <a:schemeClr val="accent1">
+        <a:tint val="50000"/>
+      </a:schemeClr>
+    </dgm:fillClrLst>
+    <dgm:linClrLst meth="repeat">
+      <a:schemeClr val="lt1"/>
+    </dgm:linClrLst>
+    <dgm:effectClrLst/>
+    <dgm:txLinClrLst/>
+    <dgm:txFillClrLst meth="repeat">
+      <a:schemeClr val="lt1"/>
+    </dgm:txFillClrLst>
+    <dgm:txEffectClrLst/>
+  </dgm:styleLbl>
+  <dgm:styleLbl name="sibTrans2D1">
+    <dgm:fillClrLst meth="repeat">
+      <a:schemeClr val="accent1">
+        <a:tint val="60000"/>
+      </a:schemeClr>
+    </dgm:fillClrLst>
+    <dgm:linClrLst meth="repeat">
+      <a:schemeClr val="accent1">
+        <a:tint val="60000"/>
+      </a:schemeClr>
+    </dgm:linClrLst>
+    <dgm:effectClrLst/>
+    <dgm:txLinClrLst/>
+    <dgm:txFillClrLst/>
+    <dgm:txEffectClrLst/>
+  </dgm:styleLbl>
+  <dgm:styleLbl name="fgSibTrans2D1">
+    <dgm:fillClrLst meth="repeat">
+      <a:schemeClr val="accent1">
+        <a:tint val="60000"/>
+      </a:schemeClr>
+    </dgm:fillClrLst>
+    <dgm:linClrLst meth="repeat">
+      <a:schemeClr val="accent1">
+        <a:tint val="60000"/>
+      </a:schemeClr>
+    </dgm:linClrLst>
+    <dgm:effectClrLst/>
+    <dgm:txLinClrLst/>
+    <dgm:txFillClrLst/>
+    <dgm:txEffectClrLst/>
+  </dgm:styleLbl>
+  <dgm:styleLbl name="bgSibTrans2D1">
+    <dgm:fillClrLst meth="repeat">
+      <a:schemeClr val="accent1">
+        <a:tint val="60000"/>
+      </a:schemeClr>
+    </dgm:fillClrLst>
+    <dgm:linClrLst meth="repeat">
+      <a:schemeClr val="accent1">
+        <a:tint val="60000"/>
+      </a:schemeClr>
+    </dgm:linClrLst>
+    <dgm:effectClrLst/>
+    <dgm:txLinClrLst/>
+    <dgm:txFillClrLst/>
+    <dgm:txEffectClrLst/>
+  </dgm:styleLbl>
+  <dgm:styleLbl name="sibTrans1D1">
+    <dgm:fillClrLst meth="repeat">
+      <a:schemeClr val="accent1"/>
+    </dgm:fillClrLst>
+    <dgm:linClrLst meth="repeat">
+      <a:schemeClr val="accent1"/>
+    </dgm:linClrLst>
+    <dgm:effectClrLst/>
+    <dgm:txLinClrLst/>
+    <dgm:txFillClrLst meth="repeat">
+      <a:schemeClr val="tx1"/>
+    </dgm:txFillClrLst>
+    <dgm:txEffectClrLst/>
+  </dgm:styleLbl>
+  <dgm:styleLbl name="callout">
+    <dgm:fillClrLst meth="repeat">
+      <a:schemeClr val="accent1"/>
+    </dgm:fillClrLst>
+    <dgm:linClrLst meth="repeat">
+      <a:schemeClr val="accent1">
+        <a:tint val="50000"/>
+      </a:schemeClr>
+    </dgm:linClrLst>
+    <dgm:effectClrLst/>
+    <dgm:txLinClrLst/>
+    <dgm:txFillClrLst meth="repeat">
+      <a:schemeClr val="tx1"/>
+    </dgm:txFillClrLst>
+    <dgm:txEffectClrLst/>
+  </dgm:styleLbl>
+  <dgm:styleLbl name="asst0">
+    <dgm:fillClrLst meth="repeat">
+      <a:schemeClr val="accent1"/>
+    </dgm:fillClrLst>
+    <dgm:linClrLst meth="repeat">
+      <a:schemeClr val="lt1"/>
+    </dgm:linClrLst>
+    <dgm:effectClrLst/>
+    <dgm:txLinClrLst/>
+    <dgm:txFillClrLst/>
+    <dgm:txEffectClrLst/>
+  </dgm:styleLbl>
+  <dgm:styleLbl name="asst1">
+    <dgm:fillClrLst meth="repeat">
+      <a:schemeClr val="accent1"/>
+    </dgm:fillClrLst>
+    <dgm:linClrLst meth="repeat">
+      <a:schemeClr val="lt1"/>
+    </dgm:linClrLst>
+    <dgm:effectClrLst/>
+    <dgm:txLinClrLst/>
+    <dgm:txFillClrLst/>
+    <dgm:txEffectClrLst/>
+  </dgm:styleLbl>
+  <dgm:styleLbl name="asst2">
+    <dgm:fillClrLst meth="repeat">
+      <a:schemeClr val="accent1"/>
+    </dgm:fillClrLst>
+    <dgm:linClrLst meth="repeat">
+      <a:schemeClr val="lt1"/>
+    </dgm:linClrLst>
+    <dgm:effectClrLst/>
+    <dgm:txLinClrLst/>
+    <dgm:txFillClrLst/>
+    <dgm:txEffectClrLst/>
+  </dgm:styleLbl>
+  <dgm:styleLbl name="asst3">
+    <dgm:fillClrLst meth="repeat">
+      <a:schemeClr val="accent1"/>
+    </dgm:fillClrLst>
+    <dgm:linClrLst meth="repeat">
+      <a:schemeClr val="lt1"/>
+    </dgm:linClrLst>
+    <dgm:effectClrLst/>
+    <dgm:txLinClrLst/>
+    <dgm:txFillClrLst/>
+    <dgm:txEffectClrLst/>
+  </dgm:styleLbl>
+  <dgm:styleLbl name="asst4">
+    <dgm:fillClrLst meth="repeat">
+      <a:schemeClr val="accent1"/>
+    </dgm:fillClrLst>
+    <dgm:linClrLst meth="repeat">
+      <a:schemeClr val="lt1"/>
+    </dgm:linClrLst>
+    <dgm:effectClrLst/>
+    <dgm:txLinClrLst/>
+    <dgm:txFillClrLst/>
+    <dgm:txEffectClrLst/>
+  </dgm:styleLbl>
+  <dgm:styleLbl name="parChTrans2D1">
+    <dgm:fillClrLst meth="repeat">
+      <a:schemeClr val="accent1">
+        <a:tint val="60000"/>
+      </a:schemeClr>
+    </dgm:fillClrLst>
+    <dgm:linClrLst meth="repeat">
+      <a:schemeClr val="accent1">
+        <a:tint val="60000"/>
+      </a:schemeClr>
+    </dgm:linClrLst>
+    <dgm:effectClrLst/>
+    <dgm:txLinClrLst/>
+    <dgm:txFillClrLst meth="repeat">
+      <a:schemeClr val="lt1"/>
+    </dgm:txFillClrLst>
+    <dgm:txEffectClrLst/>
+  </dgm:styleLbl>
+  <dgm:styleLbl name="parChTrans2D2">
+    <dgm:fillClrLst meth="repeat">
+      <a:schemeClr val="accent1"/>
+    </dgm:fillClrLst>
+    <dgm:linClrLst meth="repeat">
+      <a:schemeClr val="accent1"/>
+    </dgm:linClrLst>
+    <dgm:effectClrLst/>
+    <dgm:txLinClrLst/>
+    <dgm:txFillClrLst meth="repeat">
+      <a:schemeClr val="lt1"/>
+    </dgm:txFillClrLst>
+    <dgm:txEffectClrLst/>
+  </dgm:styleLbl>
+  <dgm:styleLbl name="parChTrans2D3">
+    <dgm:fillClrLst meth="repeat">
+      <a:schemeClr val="accent1"/>
+    </dgm:fillClrLst>
+    <dgm:linClrLst meth="repeat">
+      <a:schemeClr val="accent1"/>
+    </dgm:linClrLst>
+    <dgm:effectClrLst/>
+    <dgm:txLinClrLst/>
+    <dgm:txFillClrLst meth="repeat">
+      <a:schemeClr val="lt1"/>
+    </dgm:txFillClrLst>
+    <dgm:txEffectClrLst/>
+  </dgm:styleLbl>
+  <dgm:styleLbl name="parChTrans2D4">
+    <dgm:fillClrLst meth="repeat">
+      <a:schemeClr val="accent1"/>
+    </dgm:fillClrLst>
+    <dgm:linClrLst meth="repeat">
+      <a:schemeClr val="accent1"/>
+    </dgm:linClrLst>
+    <dgm:effectClrLst/>
+    <dgm:txLinClrLst/>
+    <dgm:txFillClrLst meth="repeat">
+      <a:schemeClr val="lt1"/>
+    </dgm:txFillClrLst>
+    <dgm:txEffectClrLst/>
+  </dgm:styleLbl>
+  <dgm:styleLbl name="parChTrans1D1">
+    <dgm:fillClrLst meth="repeat">
+      <a:schemeClr val="accent1"/>
+    </dgm:fillClrLst>
+    <dgm:linClrLst meth="repeat">
+      <a:schemeClr val="accent1">
+        <a:shade val="60000"/>
+      </a:schemeClr>
+    </dgm:linClrLst>
+    <dgm:effectClrLst/>
+    <dgm:txLinClrLst/>
+    <dgm:txFillClrLst meth="repeat">
+      <a:schemeClr val="tx1"/>
+    </dgm:txFillClrLst>
+    <dgm:txEffectClrLst/>
+  </dgm:styleLbl>
+  <dgm:styleLbl name="parChTrans1D2">
+    <dgm:fillClrLst meth="repeat">
+      <a:schemeClr val="accent1"/>
+    </dgm:fillClrLst>
+    <dgm:linClrLst meth="repeat">
+      <a:schemeClr val="accent1">
+        <a:shade val="60000"/>
+      </a:schemeClr>
+    </dgm:linClrLst>
+    <dgm:effectClrLst/>
+    <dgm:txLinClrLst/>
+    <dgm:txFillClrLst meth="repeat">
+      <a:schemeClr val="tx1"/>
+    </dgm:txFillClrLst>
+    <dgm:txEffectClrLst/>
+  </dgm:styleLbl>
+  <dgm:styleLbl name="parChTrans1D3">
+    <dgm:fillClrLst meth="repeat">
+      <a:schemeClr val="accent1"/>
+    </dgm:fillClrLst>
+    <dgm:linClrLst meth="repeat">
+      <a:schemeClr val="accent1">
+        <a:shade val="80000"/>
+      </a:schemeClr>
+    </dgm:linClrLst>
+    <dgm:effectClrLst/>
+    <dgm:txLinClrLst/>
+    <dgm:txFillClrLst meth="repeat">
+      <a:schemeClr val="tx1"/>
+    </dgm:txFillClrLst>
+    <dgm:txEffectClrLst/>
+  </dgm:styleLbl>
+  <dgm:styleLbl name="parChTrans1D4">
+    <dgm:fillClrLst meth="repeat">
+      <a:schemeClr val="accent1"/>
+    </dgm:fillClrLst>
+    <dgm:linClrLst meth="repeat">
+      <a:schemeClr val="accent1">
+        <a:shade val="80000"/>
+      </a:schemeClr>
+    </dgm:linClrLst>
+    <dgm:effectClrLst/>
+    <dgm:txLinClrLst/>
+    <dgm:txFillClrLst meth="repeat">
+      <a:schemeClr val="tx1"/>
+    </dgm:txFillClrLst>
+    <dgm:txEffectClrLst/>
+  </dgm:styleLbl>
+  <dgm:styleLbl name="fgAcc1">
+    <dgm:fillClrLst meth="repeat">
+      <a:schemeClr val="lt1">
+        <a:alpha val="90000"/>
+      </a:schemeClr>
+    </dgm:fillClrLst>
+    <dgm:linClrLst meth="repeat">
+      <a:schemeClr val="accent1"/>
+    </dgm:linClrLst>
+    <dgm:effectClrLst/>
+    <dgm:txLinClrLst/>
+    <dgm:txFillClrLst meth="repeat">
+      <a:schemeClr val="dk1"/>
+    </dgm:txFillClrLst>
+    <dgm:txEffectClrLst/>
+  </dgm:styleLbl>
+  <dgm:styleLbl name="conFgAcc1">
+    <dgm:fillClrLst meth="repeat">
+      <a:schemeClr val="lt1">
+        <a:alpha val="90000"/>
+      </a:schemeClr>
+    </dgm:fillClrLst>
+    <dgm:linClrLst meth="repeat">
+      <a:schemeClr val="accent1"/>
+    </dgm:linClrLst>
+    <dgm:effectClrLst/>
+    <dgm:txLinClrLst/>
+    <dgm:txFillClrLst meth="repeat">
+      <a:schemeClr val="dk1"/>
+    </dgm:txFillClrLst>
+    <dgm:txEffectClrLst/>
+  </dgm:styleLbl>
+  <dgm:styleLbl name="alignAcc1">
+    <dgm:fillClrLst meth="repeat">
+      <a:schemeClr val="lt1">
+        <a:alpha val="90000"/>
+      </a:schemeClr>
+    </dgm:fillClrLst>
+    <dgm:linClrLst meth="repeat">
+      <a:schemeClr val="accent1"/>
+    </dgm:linClrLst>
+    <dgm:effectClrLst/>
+    <dgm:txLinClrLst/>
+    <dgm:txFillClrLst meth="repeat">
+      <a:schemeClr val="dk1"/>
+    </dgm:txFillClrLst>
+    <dgm:txEffectClrLst/>
+  </dgm:styleLbl>
+  <dgm:styleLbl name="trAlignAcc1">
+    <dgm:fillClrLst meth="repeat">
+      <a:schemeClr val="lt1">
+        <a:alpha val="40000"/>
+      </a:schemeClr>
+    </dgm:fillClrLst>
+    <dgm:linClrLst meth="repeat">
+      <a:schemeClr val="accent1"/>
+    </dgm:linClrLst>
+    <dgm:effectClrLst/>
+    <dgm:txLinClrLst/>
+    <dgm:txFillClrLst meth="repeat">
+      <a:schemeClr val="dk1"/>
+    </dgm:txFillClrLst>
+    <dgm:txEffectClrLst/>
+  </dgm:styleLbl>
+  <dgm:styleLbl name="bgAcc1">
+    <dgm:fillClrLst meth="repeat">
+      <a:schemeClr val="lt1">
+        <a:alpha val="90000"/>
+      </a:schemeClr>
+    </dgm:fillClrLst>
+    <dgm:linClrLst meth="repeat">
+      <a:schemeClr val="accent1"/>
+    </dgm:linClrLst>
+    <dgm:effectClrLst/>
+    <dgm:txLinClrLst/>
+    <dgm:txFillClrLst meth="repeat">
+      <a:schemeClr val="dk1"/>
+    </dgm:txFillClrLst>
+    <dgm:txEffectClrLst/>
+  </dgm:styleLbl>
+  <dgm:styleLbl name="solidFgAcc1">
+    <dgm:fillClrLst meth="repeat">
+      <a:schemeClr val="lt1"/>
+    </dgm:fillClrLst>
+    <dgm:linClrLst meth="repeat">
+      <a:schemeClr val="accent1"/>
+    </dgm:linClrLst>
+    <dgm:effectClrLst/>
+    <dgm:txLinClrLst/>
+    <dgm:txFillClrLst meth="repeat">
+      <a:schemeClr val="dk1"/>
+    </dgm:txFillClrLst>
+    <dgm:txEffectClrLst/>
+  </dgm:styleLbl>
+  <dgm:styleLbl name="solidAlignAcc1">
+    <dgm:fillClrLst meth="repeat">
+      <a:schemeClr val="lt1"/>
+    </dgm:fillClrLst>
+    <dgm:linClrLst meth="repeat">
+      <a:schemeClr val="accent1"/>
+    </dgm:linClrLst>
+    <dgm:effectClrLst/>
+    <dgm:txLinClrLst/>
+    <dgm:txFillClrLst meth="repeat">
+      <a:schemeClr val="dk1"/>
+    </dgm:txFillClrLst>
+    <dgm:txEffectClrLst/>
+  </dgm:styleLbl>
+  <dgm:styleLbl name="solidBgAcc1">
+    <dgm:fillClrLst meth="repeat">
+      <a:schemeClr val="lt1"/>
+    </dgm:fillClrLst>
+    <dgm:linClrLst meth="repeat">
+      <a:schemeClr val="accent1"/>
+    </dgm:linClrLst>
+    <dgm:effectClrLst/>
+    <dgm:txLinClrLst/>
+    <dgm:txFillClrLst meth="repeat">
+      <a:schemeClr val="dk1"/>
+    </dgm:txFillClrLst>
+    <dgm:txEffectClrLst/>
+  </dgm:styleLbl>
+  <dgm:styleLbl name="fgAccFollowNode1">
+    <dgm:fillClrLst meth="repeat">
+      <a:schemeClr val="accent1">
+        <a:alpha val="90000"/>
+        <a:tint val="40000"/>
+      </a:schemeClr>
+    </dgm:fillClrLst>
+    <dgm:linClrLst meth="repeat">
+      <a:schemeClr val="accent1">
+        <a:alpha val="90000"/>
+        <a:tint val="40000"/>
+      </a:schemeClr>
+    </dgm:linClrLst>
+    <dgm:effectClrLst/>
+    <dgm:txLinClrLst/>
+    <dgm:txFillClrLst meth="repeat">
+      <a:schemeClr val="dk1"/>
+    </dgm:txFillClrLst>
+    <dgm:txEffectClrLst/>
+  </dgm:styleLbl>
+  <dgm:styleLbl name="alignAccFollowNode1">
+    <dgm:fillClrLst meth="repeat">
+      <a:schemeClr val="accent1">
+        <a:alpha val="90000"/>
+        <a:tint val="40000"/>
+      </a:schemeClr>
+    </dgm:fillClrLst>
+    <dgm:linClrLst meth="repeat">
+      <a:schemeClr val="accent1">
+        <a:alpha val="90000"/>
+        <a:tint val="40000"/>
+      </a:schemeClr>
+    </dgm:linClrLst>
+    <dgm:effectClrLst/>
+    <dgm:txLinClrLst/>
+    <dgm:txFillClrLst meth="repeat">
+      <a:schemeClr val="dk1"/>
+    </dgm:txFillClrLst>
+    <dgm:txEffectClrLst/>
+  </dgm:styleLbl>
+  <dgm:styleLbl name="bgAccFollowNode1">
+    <dgm:fillClrLst meth="repeat">
+      <a:schemeClr val="accent1">
+        <a:alpha val="90000"/>
+        <a:tint val="40000"/>
+      </a:schemeClr>
+    </dgm:fillClrLst>
+    <dgm:linClrLst meth="repeat">
+      <a:schemeClr val="accent1">
+        <a:alpha val="90000"/>
+        <a:tint val="40000"/>
+      </a:schemeClr>
+    </dgm:linClrLst>
+    <dgm:effectClrLst/>
+    <dgm:txLinClrLst/>
+    <dgm:txFillClrLst meth="repeat">
+      <a:schemeClr val="dk1"/>
+    </dgm:txFillClrLst>
+    <dgm:txEffectClrLst/>
+  </dgm:styleLbl>
+  <dgm:styleLbl name="fgAcc0">
+    <dgm:fillClrLst meth="repeat">
+      <a:schemeClr val="lt1">
+        <a:alpha val="90000"/>
+      </a:schemeClr>
+    </dgm:fillClrLst>
+    <dgm:linClrLst meth="repeat">
+      <a:schemeClr val="accent1"/>
+    </dgm:linClrLst>
+    <dgm:effectClrLst/>
+    <dgm:txLinClrLst/>
+    <dgm:txFillClrLst meth="repeat">
+      <a:schemeClr val="dk1"/>
+    </dgm:txFillClrLst>
+    <dgm:txEffectClrLst/>
+  </dgm:styleLbl>
+  <dgm:styleLbl name="fgAcc2">
+    <dgm:fillClrLst meth="repeat">
+      <a:schemeClr val="lt1">
+        <a:alpha val="90000"/>
+      </a:schemeClr>
+    </dgm:fillClrLst>
+    <dgm:linClrLst meth="repeat">
+      <a:schemeClr val="accent1"/>
+    </dgm:linClrLst>
+    <dgm:effectClrLst/>
+    <dgm:txLinClrLst/>
+    <dgm:txFillClrLst meth="repeat">
+      <a:schemeClr val="dk1"/>
+    </dgm:txFillClrLst>
+    <dgm:txEffectClrLst/>
+  </dgm:styleLbl>
+  <dgm:styleLbl name="fgAcc3">
+    <dgm:fillClrLst meth="repeat">
+      <a:schemeClr val="lt1">
+        <a:alpha val="90000"/>
+      </a:schemeClr>
+    </dgm:fillClrLst>
+    <dgm:linClrLst meth="repeat">
+      <a:schemeClr val="accent1"/>
+    </dgm:linClrLst>
+    <dgm:effectClrLst/>
+    <dgm:txLinClrLst/>
+    <dgm:txFillClrLst meth="repeat">
+      <a:schemeClr val="dk1"/>
+    </dgm:txFillClrLst>
+    <dgm:txEffectClrLst/>
+  </dgm:styleLbl>
+  <dgm:styleLbl name="fgAcc4">
+    <dgm:fillClrLst meth="repeat">
+      <a:schemeClr val="lt1">
+        <a:alpha val="90000"/>
+      </a:schemeClr>
+    </dgm:fillClrLst>
+    <dgm:linClrLst meth="repeat">
+      <a:schemeClr val="accent1"/>
+    </dgm:linClrLst>
+    <dgm:effectClrLst/>
+    <dgm:txLinClrLst/>
+    <dgm:txFillClrLst meth="repeat">
+      <a:schemeClr val="dk1"/>
+    </dgm:txFillClrLst>
+    <dgm:txEffectClrLst/>
+  </dgm:styleLbl>
+  <dgm:styleLbl name="bgShp">
+    <dgm:fillClrLst meth="repeat">
+      <a:schemeClr val="accent1">
+        <a:tint val="40000"/>
+      </a:schemeClr>
+    </dgm:fillClrLst>
+    <dgm:linClrLst meth="repeat">
+      <a:schemeClr val="accent1"/>
+    </dgm:linClrLst>
+    <dgm:effectClrLst/>
+    <dgm:txLinClrLst/>
+    <dgm:txFillClrLst meth="repeat">
+      <a:schemeClr val="dk1"/>
+    </dgm:txFillClrLst>
+    <dgm:txEffectClrLst/>
+  </dgm:styleLbl>
+  <dgm:styleLbl name="dkBgShp">
+    <dgm:fillClrLst meth="repeat">
+      <a:schemeClr val="accent1">
+        <a:shade val="80000"/>
+      </a:schemeClr>
+    </dgm:fillClrLst>
+    <dgm:linClrLst meth="repeat">
+      <a:schemeClr val="accent1"/>
+    </dgm:linClrLst>
+    <dgm:effectClrLst/>
+    <dgm:txLinClrLst/>
+    <dgm:txFillClrLst meth="repeat">
+      <a:schemeClr val="lt1"/>
+    </dgm:txFillClrLst>
+    <dgm:txEffectClrLst/>
+  </dgm:styleLbl>
+  <dgm:styleLbl name="trBgShp">
+    <dgm:fillClrLst meth="repeat">
+      <a:schemeClr val="accent1">
+        <a:tint val="50000"/>
+        <a:alpha val="40000"/>
+      </a:schemeClr>
+    </dgm:fillClrLst>
+    <dgm:linClrLst meth="repeat">
+      <a:schemeClr val="accent1"/>
+    </dgm:linClrLst>
+    <dgm:effectClrLst/>
+    <dgm:txLinClrLst/>
+    <dgm:txFillClrLst meth="repeat">
+      <a:schemeClr val="lt1"/>
+    </dgm:txFillClrLst>
+    <dgm:txEffectClrLst/>
+  </dgm:styleLbl>
+  <dgm:styleLbl name="fgShp">
+    <dgm:fillClrLst meth="repeat">
+      <a:schemeClr val="accent1">
+        <a:tint val="60000"/>
+      </a:schemeClr>
+    </dgm:fillClrLst>
+    <dgm:linClrLst meth="repeat">
+      <a:schemeClr val="lt1"/>
+    </dgm:linClrLst>
+    <dgm:effectClrLst/>
+    <dgm:txLinClrLst/>
+    <dgm:txFillClrLst meth="repeat">
+      <a:schemeClr val="dk1"/>
+    </dgm:txFillClrLst>
+    <dgm:txEffectClrLst/>
+  </dgm:styleLbl>
+  <dgm:styleLbl name="revTx">
+    <dgm:fillClrLst meth="repeat">
+      <a:schemeClr val="lt1">
+        <a:alpha val="0"/>
+      </a:schemeClr>
+    </dgm:fillClrLst>
+    <dgm:linClrLst meth="repeat">
+      <a:schemeClr val="dk1">
+        <a:alpha val="0"/>
+      </a:schemeClr>
+    </dgm:linClrLst>
+    <dgm:effectClrLst/>
+    <dgm:txLinClrLst/>
+    <dgm:txFillClrLst meth="repeat">
+      <a:schemeClr val="tx1"/>
+    </dgm:txFillClrLst>
+    <dgm:txEffectClrLst/>
+  </dgm:styleLbl>
+</dgm:colorsDef>
+</file>
+
+<file path=ppt/diagrams/data1.xml><?xml version="1.0" encoding="utf-8"?>
+<dgm:dataModel xmlns:dgm="http://schemas.openxmlformats.org/drawingml/2006/diagram" xmlns:a="http://schemas.openxmlformats.org/drawingml/2006/main">
+  <dgm:ptLst>
+    <dgm:pt modelId="{C0ECF47B-3FF0-41FF-A46B-151A9DD81918}" type="doc">
+      <dgm:prSet loTypeId="urn:microsoft.com/office/officeart/2005/8/layout/process1" loCatId="process" qsTypeId="urn:microsoft.com/office/officeart/2005/8/quickstyle/simple1" qsCatId="simple" csTypeId="urn:microsoft.com/office/officeart/2005/8/colors/accent1_2" csCatId="accent1" phldr="1"/>
+      <dgm:spPr/>
+    </dgm:pt>
+    <dgm:pt modelId="{051D36E9-987A-41CA-8CB6-3C50877B3C05}">
+      <dgm:prSet phldrT="[Szöveg]"/>
+      <dgm:spPr/>
+      <dgm:t>
+        <a:bodyPr/>
+        <a:lstStyle/>
+        <a:p>
+          <a:r>
+            <a:rPr lang="hu-HU" dirty="0" smtClean="0"/>
+            <a:t>Célok kitűzése</a:t>
+          </a:r>
+          <a:endParaRPr lang="hu-HU" dirty="0"/>
+        </a:p>
+      </dgm:t>
+    </dgm:pt>
+    <dgm:pt modelId="{3C74A1C8-3D2C-4489-9F10-165968D090A6}" type="parTrans" cxnId="{0932562D-B675-4026-925D-6FEB8C0348D4}">
+      <dgm:prSet/>
+      <dgm:spPr/>
+      <dgm:t>
+        <a:bodyPr/>
+        <a:lstStyle/>
+        <a:p>
+          <a:endParaRPr lang="hu-HU"/>
+        </a:p>
+      </dgm:t>
+    </dgm:pt>
+    <dgm:pt modelId="{035317E7-1931-4CCF-8253-D297D614F65D}" type="sibTrans" cxnId="{0932562D-B675-4026-925D-6FEB8C0348D4}">
+      <dgm:prSet/>
+      <dgm:spPr/>
+      <dgm:t>
+        <a:bodyPr/>
+        <a:lstStyle/>
+        <a:p>
+          <a:endParaRPr lang="hu-HU"/>
+        </a:p>
+      </dgm:t>
+    </dgm:pt>
+    <dgm:pt modelId="{1BAEEFC6-AAFD-4863-B30A-AC8C87771178}">
+      <dgm:prSet phldrT="[Szöveg]"/>
+      <dgm:spPr/>
+      <dgm:t>
+        <a:bodyPr/>
+        <a:lstStyle/>
+        <a:p>
+          <a:r>
+            <a:rPr lang="hu-HU" dirty="0" smtClean="0"/>
+            <a:t>Tervezés (feladatok)</a:t>
+          </a:r>
+          <a:endParaRPr lang="hu-HU" dirty="0"/>
+        </a:p>
+      </dgm:t>
+    </dgm:pt>
+    <dgm:pt modelId="{2508F76C-4CB9-4515-BB43-8579DF274E8C}" type="parTrans" cxnId="{F36B6AB7-CE5B-4593-B6F7-73E6DF2E7A17}">
+      <dgm:prSet/>
+      <dgm:spPr/>
+      <dgm:t>
+        <a:bodyPr/>
+        <a:lstStyle/>
+        <a:p>
+          <a:endParaRPr lang="hu-HU"/>
+        </a:p>
+      </dgm:t>
+    </dgm:pt>
+    <dgm:pt modelId="{AD26165B-05E2-4E11-9A64-983B6E5A8416}" type="sibTrans" cxnId="{F36B6AB7-CE5B-4593-B6F7-73E6DF2E7A17}">
+      <dgm:prSet/>
+      <dgm:spPr/>
+      <dgm:t>
+        <a:bodyPr/>
+        <a:lstStyle/>
+        <a:p>
+          <a:endParaRPr lang="hu-HU"/>
+        </a:p>
+      </dgm:t>
+    </dgm:pt>
+    <dgm:pt modelId="{5CE76F70-AA14-4CF9-9380-28D031F50E1C}">
+      <dgm:prSet phldrT="[Szöveg]"/>
+      <dgm:spPr/>
+      <dgm:t>
+        <a:bodyPr/>
+        <a:lstStyle/>
+        <a:p>
+          <a:r>
+            <a:rPr lang="hu-HU" dirty="0" smtClean="0"/>
+            <a:t>Tesztelés/ellenőrzés</a:t>
+          </a:r>
+          <a:endParaRPr lang="hu-HU" dirty="0"/>
+        </a:p>
+      </dgm:t>
+    </dgm:pt>
+    <dgm:pt modelId="{41FD3F1E-8799-4A23-B3DD-6EBC64087E63}" type="parTrans" cxnId="{7F0A7A66-4C0E-480C-A175-CC65932AF847}">
+      <dgm:prSet/>
+      <dgm:spPr/>
+      <dgm:t>
+        <a:bodyPr/>
+        <a:lstStyle/>
+        <a:p>
+          <a:endParaRPr lang="hu-HU"/>
+        </a:p>
+      </dgm:t>
+    </dgm:pt>
+    <dgm:pt modelId="{A9C81B1D-29AD-4A58-A4A0-7EDA4C672CC0}" type="sibTrans" cxnId="{7F0A7A66-4C0E-480C-A175-CC65932AF847}">
+      <dgm:prSet/>
+      <dgm:spPr/>
+      <dgm:t>
+        <a:bodyPr/>
+        <a:lstStyle/>
+        <a:p>
+          <a:endParaRPr lang="hu-HU"/>
+        </a:p>
+      </dgm:t>
+    </dgm:pt>
+    <dgm:pt modelId="{14D8F961-F41D-4489-A441-D767575EC57C}">
+      <dgm:prSet phldrT="[Szöveg]"/>
+      <dgm:spPr/>
+      <dgm:t>
+        <a:bodyPr/>
+        <a:lstStyle/>
+        <a:p>
+          <a:r>
+            <a:rPr lang="hu-HU" dirty="0" smtClean="0"/>
+            <a:t>Megvalósítás</a:t>
+          </a:r>
+          <a:endParaRPr lang="hu-HU" dirty="0"/>
+        </a:p>
+      </dgm:t>
+    </dgm:pt>
+    <dgm:pt modelId="{D322A33F-223A-44C1-A4AD-ECA23167EFD7}" type="parTrans" cxnId="{0706BF1A-9EEE-4DC1-ACD4-30AE3B4BEDDE}">
+      <dgm:prSet/>
+      <dgm:spPr/>
+      <dgm:t>
+        <a:bodyPr/>
+        <a:lstStyle/>
+        <a:p>
+          <a:endParaRPr lang="hu-HU"/>
+        </a:p>
+      </dgm:t>
+    </dgm:pt>
+    <dgm:pt modelId="{A58EB089-6095-418F-85C7-FF27AFDAD8F7}" type="sibTrans" cxnId="{0706BF1A-9EEE-4DC1-ACD4-30AE3B4BEDDE}">
+      <dgm:prSet/>
+      <dgm:spPr/>
+      <dgm:t>
+        <a:bodyPr/>
+        <a:lstStyle/>
+        <a:p>
+          <a:endParaRPr lang="hu-HU" dirty="0"/>
+        </a:p>
+      </dgm:t>
+    </dgm:pt>
+    <dgm:pt modelId="{C9A32C1B-8A1F-44F6-A5BB-2DF8872D7669}">
+      <dgm:prSet phldrT="[Szöveg]"/>
+      <dgm:spPr/>
+      <dgm:t>
+        <a:bodyPr/>
+        <a:lstStyle/>
+        <a:p>
+          <a:r>
+            <a:rPr lang="hu-HU" dirty="0" smtClean="0"/>
+            <a:t>Dokumentáció/zárás</a:t>
+          </a:r>
+          <a:endParaRPr lang="hu-HU" dirty="0"/>
+        </a:p>
+      </dgm:t>
+    </dgm:pt>
+    <dgm:pt modelId="{32879C2B-1657-4403-A6AD-5EE7BF427167}" type="parTrans" cxnId="{7F196CD0-07A6-4D02-AC17-843BA30BF1E1}">
+      <dgm:prSet/>
+      <dgm:spPr/>
+      <dgm:t>
+        <a:bodyPr/>
+        <a:lstStyle/>
+        <a:p>
+          <a:endParaRPr lang="hu-HU"/>
+        </a:p>
+      </dgm:t>
+    </dgm:pt>
+    <dgm:pt modelId="{90C0B1DA-439F-4771-80D6-CF5CFBFDBC5D}" type="sibTrans" cxnId="{7F196CD0-07A6-4D02-AC17-843BA30BF1E1}">
+      <dgm:prSet/>
+      <dgm:spPr/>
+      <dgm:t>
+        <a:bodyPr/>
+        <a:lstStyle/>
+        <a:p>
+          <a:endParaRPr lang="hu-HU"/>
+        </a:p>
+      </dgm:t>
+    </dgm:pt>
+    <dgm:pt modelId="{9BDBF8E7-7170-4456-9480-216DFF65B3E5}" type="pres">
+      <dgm:prSet presAssocID="{C0ECF47B-3FF0-41FF-A46B-151A9DD81918}" presName="Name0" presStyleCnt="0">
+        <dgm:presLayoutVars>
+          <dgm:dir/>
+          <dgm:resizeHandles val="exact"/>
+        </dgm:presLayoutVars>
+      </dgm:prSet>
+      <dgm:spPr/>
+    </dgm:pt>
+    <dgm:pt modelId="{B87C5FC3-9DB1-4A88-8F94-78C495906F7A}" type="pres">
+      <dgm:prSet presAssocID="{051D36E9-987A-41CA-8CB6-3C50877B3C05}" presName="node" presStyleLbl="node1" presStyleIdx="0" presStyleCnt="5" custScaleX="90805" custScaleY="86047" custLinFactY="-100000" custLinFactNeighborX="13134" custLinFactNeighborY="-100157">
+        <dgm:presLayoutVars>
+          <dgm:bulletEnabled val="1"/>
+        </dgm:presLayoutVars>
+      </dgm:prSet>
+      <dgm:spPr/>
+      <dgm:t>
+        <a:bodyPr/>
+        <a:lstStyle/>
+        <a:p>
+          <a:endParaRPr lang="hu-HU"/>
+        </a:p>
+      </dgm:t>
+    </dgm:pt>
+    <dgm:pt modelId="{92367929-9241-4DC0-8BE1-E4EFE43C7E92}" type="pres">
+      <dgm:prSet presAssocID="{035317E7-1931-4CCF-8253-D297D614F65D}" presName="sibTrans" presStyleLbl="sibTrans2D1" presStyleIdx="0" presStyleCnt="4"/>
+      <dgm:spPr/>
+    </dgm:pt>
+    <dgm:pt modelId="{3D054FA9-51EF-4594-93C9-7F64BE480B11}" type="pres">
+      <dgm:prSet presAssocID="{035317E7-1931-4CCF-8253-D297D614F65D}" presName="connectorText" presStyleLbl="sibTrans2D1" presStyleIdx="0" presStyleCnt="4"/>
+      <dgm:spPr/>
+    </dgm:pt>
+    <dgm:pt modelId="{97B97CAD-3C50-4A26-8CA7-2B4638821A5B}" type="pres">
+      <dgm:prSet presAssocID="{1BAEEFC6-AAFD-4863-B30A-AC8C87771178}" presName="node" presStyleLbl="node1" presStyleIdx="1" presStyleCnt="5" custLinFactY="-7513" custLinFactNeighborX="-8048" custLinFactNeighborY="-100000">
+        <dgm:presLayoutVars>
+          <dgm:bulletEnabled val="1"/>
+        </dgm:presLayoutVars>
+      </dgm:prSet>
+      <dgm:spPr/>
+      <dgm:t>
+        <a:bodyPr/>
+        <a:lstStyle/>
+        <a:p>
+          <a:endParaRPr lang="hu-HU"/>
+        </a:p>
+      </dgm:t>
+    </dgm:pt>
+    <dgm:pt modelId="{E759324C-057D-4AC7-BC8A-941AB985C9AA}" type="pres">
+      <dgm:prSet presAssocID="{AD26165B-05E2-4E11-9A64-983B6E5A8416}" presName="sibTrans" presStyleLbl="sibTrans2D1" presStyleIdx="1" presStyleCnt="4"/>
+      <dgm:spPr/>
+    </dgm:pt>
+    <dgm:pt modelId="{5588D5F8-1C28-4D04-91B5-AA89D32B5814}" type="pres">
+      <dgm:prSet presAssocID="{AD26165B-05E2-4E11-9A64-983B6E5A8416}" presName="connectorText" presStyleLbl="sibTrans2D1" presStyleIdx="1" presStyleCnt="4"/>
+      <dgm:spPr/>
+    </dgm:pt>
+    <dgm:pt modelId="{7CB3DF0F-CDDD-4083-AD36-8DCA15821622}" type="pres">
+      <dgm:prSet presAssocID="{14D8F961-F41D-4489-A441-D767575EC57C}" presName="node" presStyleLbl="node1" presStyleIdx="2" presStyleCnt="5" custLinFactNeighborX="-52827" custLinFactNeighborY="-4274">
+        <dgm:presLayoutVars>
+          <dgm:bulletEnabled val="1"/>
+        </dgm:presLayoutVars>
+      </dgm:prSet>
+      <dgm:spPr/>
+    </dgm:pt>
+    <dgm:pt modelId="{BA076D04-DB9D-4DDA-B82F-AB5D2C6DB14B}" type="pres">
+      <dgm:prSet presAssocID="{A58EB089-6095-418F-85C7-FF27AFDAD8F7}" presName="sibTrans" presStyleLbl="sibTrans2D1" presStyleIdx="2" presStyleCnt="4"/>
+      <dgm:spPr/>
+    </dgm:pt>
+    <dgm:pt modelId="{83A8AA67-F8DD-49D2-8CF8-74F78E36EB8D}" type="pres">
+      <dgm:prSet presAssocID="{A58EB089-6095-418F-85C7-FF27AFDAD8F7}" presName="connectorText" presStyleLbl="sibTrans2D1" presStyleIdx="2" presStyleCnt="4"/>
+      <dgm:spPr/>
+    </dgm:pt>
+    <dgm:pt modelId="{010F3DCD-B85D-422E-89E8-6EB63947AD4A}" type="pres">
+      <dgm:prSet presAssocID="{5CE76F70-AA14-4CF9-9380-28D031F50E1C}" presName="node" presStyleLbl="node1" presStyleIdx="3" presStyleCnt="5" custLinFactNeighborX="-74819" custLinFactNeighborY="86379">
+        <dgm:presLayoutVars>
+          <dgm:bulletEnabled val="1"/>
+        </dgm:presLayoutVars>
+      </dgm:prSet>
+      <dgm:spPr/>
+      <dgm:t>
+        <a:bodyPr/>
+        <a:lstStyle/>
+        <a:p>
+          <a:endParaRPr lang="hu-HU"/>
+        </a:p>
+      </dgm:t>
+    </dgm:pt>
+    <dgm:pt modelId="{F60DA35A-D842-4BEF-B428-2768A2F211ED}" type="pres">
+      <dgm:prSet presAssocID="{A9C81B1D-29AD-4A58-A4A0-7EDA4C672CC0}" presName="sibTrans" presStyleLbl="sibTrans2D1" presStyleIdx="3" presStyleCnt="4"/>
+      <dgm:spPr/>
+    </dgm:pt>
+    <dgm:pt modelId="{AC6C2F1A-4F4C-4957-B02B-EA5214A91F7D}" type="pres">
+      <dgm:prSet presAssocID="{A9C81B1D-29AD-4A58-A4A0-7EDA4C672CC0}" presName="connectorText" presStyleLbl="sibTrans2D1" presStyleIdx="3" presStyleCnt="4"/>
+      <dgm:spPr/>
+    </dgm:pt>
+    <dgm:pt modelId="{E6B72C96-3ACE-4E7D-989C-ECFD7E3A2A87}" type="pres">
+      <dgm:prSet presAssocID="{C9A32C1B-8A1F-44F6-A5BB-2DF8872D7669}" presName="node" presStyleLbl="node1" presStyleIdx="4" presStyleCnt="5" custLinFactX="-212" custLinFactY="91986" custLinFactNeighborX="-100000" custLinFactNeighborY="100000">
+        <dgm:presLayoutVars>
+          <dgm:bulletEnabled val="1"/>
+        </dgm:presLayoutVars>
+      </dgm:prSet>
+      <dgm:spPr/>
+      <dgm:t>
+        <a:bodyPr/>
+        <a:lstStyle/>
+        <a:p>
+          <a:endParaRPr lang="hu-HU"/>
+        </a:p>
+      </dgm:t>
+    </dgm:pt>
+  </dgm:ptLst>
+  <dgm:cxnLst>
+    <dgm:cxn modelId="{5E04817D-2095-4CA7-A01A-E8529FCFE294}" type="presOf" srcId="{035317E7-1931-4CCF-8253-D297D614F65D}" destId="{92367929-9241-4DC0-8BE1-E4EFE43C7E92}" srcOrd="0" destOrd="0" presId="urn:microsoft.com/office/officeart/2005/8/layout/process1"/>
+    <dgm:cxn modelId="{FB837C03-B8B0-406D-8C16-0C1B2CC50397}" type="presOf" srcId="{AD26165B-05E2-4E11-9A64-983B6E5A8416}" destId="{5588D5F8-1C28-4D04-91B5-AA89D32B5814}" srcOrd="1" destOrd="0" presId="urn:microsoft.com/office/officeart/2005/8/layout/process1"/>
+    <dgm:cxn modelId="{0706BF1A-9EEE-4DC1-ACD4-30AE3B4BEDDE}" srcId="{C0ECF47B-3FF0-41FF-A46B-151A9DD81918}" destId="{14D8F961-F41D-4489-A441-D767575EC57C}" srcOrd="2" destOrd="0" parTransId="{D322A33F-223A-44C1-A4AD-ECA23167EFD7}" sibTransId="{A58EB089-6095-418F-85C7-FF27AFDAD8F7}"/>
+    <dgm:cxn modelId="{049EADE1-E081-4F96-B5D2-C9A1D904F16B}" type="presOf" srcId="{AD26165B-05E2-4E11-9A64-983B6E5A8416}" destId="{E759324C-057D-4AC7-BC8A-941AB985C9AA}" srcOrd="0" destOrd="0" presId="urn:microsoft.com/office/officeart/2005/8/layout/process1"/>
+    <dgm:cxn modelId="{76DD8575-51AC-44F5-B9F7-638E9C8D4734}" type="presOf" srcId="{A58EB089-6095-418F-85C7-FF27AFDAD8F7}" destId="{83A8AA67-F8DD-49D2-8CF8-74F78E36EB8D}" srcOrd="1" destOrd="0" presId="urn:microsoft.com/office/officeart/2005/8/layout/process1"/>
+    <dgm:cxn modelId="{52518DE5-7310-47B7-98C3-8A04A055C400}" type="presOf" srcId="{A9C81B1D-29AD-4A58-A4A0-7EDA4C672CC0}" destId="{F60DA35A-D842-4BEF-B428-2768A2F211ED}" srcOrd="0" destOrd="0" presId="urn:microsoft.com/office/officeart/2005/8/layout/process1"/>
+    <dgm:cxn modelId="{1CAD587E-0D36-4B5F-A233-5DA61586C4B5}" type="presOf" srcId="{C9A32C1B-8A1F-44F6-A5BB-2DF8872D7669}" destId="{E6B72C96-3ACE-4E7D-989C-ECFD7E3A2A87}" srcOrd="0" destOrd="0" presId="urn:microsoft.com/office/officeart/2005/8/layout/process1"/>
+    <dgm:cxn modelId="{BAFD4338-2DCA-4F7B-B5DF-4E601975731B}" type="presOf" srcId="{1BAEEFC6-AAFD-4863-B30A-AC8C87771178}" destId="{97B97CAD-3C50-4A26-8CA7-2B4638821A5B}" srcOrd="0" destOrd="0" presId="urn:microsoft.com/office/officeart/2005/8/layout/process1"/>
+    <dgm:cxn modelId="{0932562D-B675-4026-925D-6FEB8C0348D4}" srcId="{C0ECF47B-3FF0-41FF-A46B-151A9DD81918}" destId="{051D36E9-987A-41CA-8CB6-3C50877B3C05}" srcOrd="0" destOrd="0" parTransId="{3C74A1C8-3D2C-4489-9F10-165968D090A6}" sibTransId="{035317E7-1931-4CCF-8253-D297D614F65D}"/>
+    <dgm:cxn modelId="{F36B6AB7-CE5B-4593-B6F7-73E6DF2E7A17}" srcId="{C0ECF47B-3FF0-41FF-A46B-151A9DD81918}" destId="{1BAEEFC6-AAFD-4863-B30A-AC8C87771178}" srcOrd="1" destOrd="0" parTransId="{2508F76C-4CB9-4515-BB43-8579DF274E8C}" sibTransId="{AD26165B-05E2-4E11-9A64-983B6E5A8416}"/>
+    <dgm:cxn modelId="{CA1E47BD-19AA-41AE-8E24-E168BE72220F}" type="presOf" srcId="{051D36E9-987A-41CA-8CB6-3C50877B3C05}" destId="{B87C5FC3-9DB1-4A88-8F94-78C495906F7A}" srcOrd="0" destOrd="0" presId="urn:microsoft.com/office/officeart/2005/8/layout/process1"/>
+    <dgm:cxn modelId="{7F196CD0-07A6-4D02-AC17-843BA30BF1E1}" srcId="{C0ECF47B-3FF0-41FF-A46B-151A9DD81918}" destId="{C9A32C1B-8A1F-44F6-A5BB-2DF8872D7669}" srcOrd="4" destOrd="0" parTransId="{32879C2B-1657-4403-A6AD-5EE7BF427167}" sibTransId="{90C0B1DA-439F-4771-80D6-CF5CFBFDBC5D}"/>
+    <dgm:cxn modelId="{3A7F4403-8837-45A8-AFAA-BE7AAC2FABB3}" type="presOf" srcId="{A9C81B1D-29AD-4A58-A4A0-7EDA4C672CC0}" destId="{AC6C2F1A-4F4C-4957-B02B-EA5214A91F7D}" srcOrd="1" destOrd="0" presId="urn:microsoft.com/office/officeart/2005/8/layout/process1"/>
+    <dgm:cxn modelId="{6857E5E6-7350-4F29-BA46-296E54734A29}" type="presOf" srcId="{035317E7-1931-4CCF-8253-D297D614F65D}" destId="{3D054FA9-51EF-4594-93C9-7F64BE480B11}" srcOrd="1" destOrd="0" presId="urn:microsoft.com/office/officeart/2005/8/layout/process1"/>
+    <dgm:cxn modelId="{6C731811-A1C0-4D16-9F7C-28A5973893D8}" type="presOf" srcId="{C0ECF47B-3FF0-41FF-A46B-151A9DD81918}" destId="{9BDBF8E7-7170-4456-9480-216DFF65B3E5}" srcOrd="0" destOrd="0" presId="urn:microsoft.com/office/officeart/2005/8/layout/process1"/>
+    <dgm:cxn modelId="{EC571DBA-6DCF-4549-83B3-4689CF76E36D}" type="presOf" srcId="{5CE76F70-AA14-4CF9-9380-28D031F50E1C}" destId="{010F3DCD-B85D-422E-89E8-6EB63947AD4A}" srcOrd="0" destOrd="0" presId="urn:microsoft.com/office/officeart/2005/8/layout/process1"/>
+    <dgm:cxn modelId="{3DEB7731-419E-4A09-BD38-FE70F8886ADA}" type="presOf" srcId="{14D8F961-F41D-4489-A441-D767575EC57C}" destId="{7CB3DF0F-CDDD-4083-AD36-8DCA15821622}" srcOrd="0" destOrd="0" presId="urn:microsoft.com/office/officeart/2005/8/layout/process1"/>
+    <dgm:cxn modelId="{7F0A7A66-4C0E-480C-A175-CC65932AF847}" srcId="{C0ECF47B-3FF0-41FF-A46B-151A9DD81918}" destId="{5CE76F70-AA14-4CF9-9380-28D031F50E1C}" srcOrd="3" destOrd="0" parTransId="{41FD3F1E-8799-4A23-B3DD-6EBC64087E63}" sibTransId="{A9C81B1D-29AD-4A58-A4A0-7EDA4C672CC0}"/>
+    <dgm:cxn modelId="{71FBE622-8758-42A4-BE96-A38F067F1507}" type="presOf" srcId="{A58EB089-6095-418F-85C7-FF27AFDAD8F7}" destId="{BA076D04-DB9D-4DDA-B82F-AB5D2C6DB14B}" srcOrd="0" destOrd="0" presId="urn:microsoft.com/office/officeart/2005/8/layout/process1"/>
+    <dgm:cxn modelId="{C09B27B7-4B18-4CC6-A7F5-01C183BD9184}" type="presParOf" srcId="{9BDBF8E7-7170-4456-9480-216DFF65B3E5}" destId="{B87C5FC3-9DB1-4A88-8F94-78C495906F7A}" srcOrd="0" destOrd="0" presId="urn:microsoft.com/office/officeart/2005/8/layout/process1"/>
+    <dgm:cxn modelId="{E34FE064-8D96-461A-A5F4-9CCFB26A6A43}" type="presParOf" srcId="{9BDBF8E7-7170-4456-9480-216DFF65B3E5}" destId="{92367929-9241-4DC0-8BE1-E4EFE43C7E92}" srcOrd="1" destOrd="0" presId="urn:microsoft.com/office/officeart/2005/8/layout/process1"/>
+    <dgm:cxn modelId="{EE9FEA92-4CAB-45FF-B13C-DF5593CE289F}" type="presParOf" srcId="{92367929-9241-4DC0-8BE1-E4EFE43C7E92}" destId="{3D054FA9-51EF-4594-93C9-7F64BE480B11}" srcOrd="0" destOrd="0" presId="urn:microsoft.com/office/officeart/2005/8/layout/process1"/>
+    <dgm:cxn modelId="{D3B9085A-42F2-4B9B-A544-B807645F6374}" type="presParOf" srcId="{9BDBF8E7-7170-4456-9480-216DFF65B3E5}" destId="{97B97CAD-3C50-4A26-8CA7-2B4638821A5B}" srcOrd="2" destOrd="0" presId="urn:microsoft.com/office/officeart/2005/8/layout/process1"/>
+    <dgm:cxn modelId="{5ACBE767-744D-4A1C-8583-9EE7A7063EF4}" type="presParOf" srcId="{9BDBF8E7-7170-4456-9480-216DFF65B3E5}" destId="{E759324C-057D-4AC7-BC8A-941AB985C9AA}" srcOrd="3" destOrd="0" presId="urn:microsoft.com/office/officeart/2005/8/layout/process1"/>
+    <dgm:cxn modelId="{53C065C7-0027-4056-A608-D3CC1C698A0E}" type="presParOf" srcId="{E759324C-057D-4AC7-BC8A-941AB985C9AA}" destId="{5588D5F8-1C28-4D04-91B5-AA89D32B5814}" srcOrd="0" destOrd="0" presId="urn:microsoft.com/office/officeart/2005/8/layout/process1"/>
+    <dgm:cxn modelId="{4BAF288E-C222-4086-BA4B-9D0DA9A01F78}" type="presParOf" srcId="{9BDBF8E7-7170-4456-9480-216DFF65B3E5}" destId="{7CB3DF0F-CDDD-4083-AD36-8DCA15821622}" srcOrd="4" destOrd="0" presId="urn:microsoft.com/office/officeart/2005/8/layout/process1"/>
+    <dgm:cxn modelId="{566DB118-74DC-4EA7-ACDC-744A4CA44A68}" type="presParOf" srcId="{9BDBF8E7-7170-4456-9480-216DFF65B3E5}" destId="{BA076D04-DB9D-4DDA-B82F-AB5D2C6DB14B}" srcOrd="5" destOrd="0" presId="urn:microsoft.com/office/officeart/2005/8/layout/process1"/>
+    <dgm:cxn modelId="{7BCD31B1-AFAC-4BAF-9D06-0A61AE507CFD}" type="presParOf" srcId="{BA076D04-DB9D-4DDA-B82F-AB5D2C6DB14B}" destId="{83A8AA67-F8DD-49D2-8CF8-74F78E36EB8D}" srcOrd="0" destOrd="0" presId="urn:microsoft.com/office/officeart/2005/8/layout/process1"/>
+    <dgm:cxn modelId="{9A310390-00E8-4CF0-91CC-3BEC97FFA54A}" type="presParOf" srcId="{9BDBF8E7-7170-4456-9480-216DFF65B3E5}" destId="{010F3DCD-B85D-422E-89E8-6EB63947AD4A}" srcOrd="6" destOrd="0" presId="urn:microsoft.com/office/officeart/2005/8/layout/process1"/>
+    <dgm:cxn modelId="{54126792-14C0-4D7D-946A-98AFE29F149B}" type="presParOf" srcId="{9BDBF8E7-7170-4456-9480-216DFF65B3E5}" destId="{F60DA35A-D842-4BEF-B428-2768A2F211ED}" srcOrd="7" destOrd="0" presId="urn:microsoft.com/office/officeart/2005/8/layout/process1"/>
+    <dgm:cxn modelId="{4E35C05B-9453-43C2-BE24-D679F35E6DA0}" type="presParOf" srcId="{F60DA35A-D842-4BEF-B428-2768A2F211ED}" destId="{AC6C2F1A-4F4C-4957-B02B-EA5214A91F7D}" srcOrd="0" destOrd="0" presId="urn:microsoft.com/office/officeart/2005/8/layout/process1"/>
+    <dgm:cxn modelId="{F21B15B3-2AE6-49ED-8DE2-5E91F0282354}" type="presParOf" srcId="{9BDBF8E7-7170-4456-9480-216DFF65B3E5}" destId="{E6B72C96-3ACE-4E7D-989C-ECFD7E3A2A87}" srcOrd="8" destOrd="0" presId="urn:microsoft.com/office/officeart/2005/8/layout/process1"/>
+  </dgm:cxnLst>
+  <dgm:bg/>
+  <dgm:whole/>
+  <dgm:extLst>
+    <a:ext uri="http://schemas.microsoft.com/office/drawing/2008/diagram">
+      <dsp:dataModelExt xmlns:dsp="http://schemas.microsoft.com/office/drawing/2008/diagram" relId="rId6" minVer="http://schemas.openxmlformats.org/drawingml/2006/diagram"/>
+    </a:ext>
+  </dgm:extLst>
+</dgm:dataModel>
+</file>
+
+<file path=ppt/diagrams/drawing1.xml><?xml version="1.0" encoding="utf-8"?>
+<dsp:drawing xmlns:dgm="http://schemas.openxmlformats.org/drawingml/2006/diagram" xmlns:dsp="http://schemas.microsoft.com/office/drawing/2008/diagram" xmlns:a="http://schemas.openxmlformats.org/drawingml/2006/main">
+  <dsp:spTree>
+    <dsp:nvGrpSpPr>
+      <dsp:cNvPr id="0" name=""/>
+      <dsp:cNvGrpSpPr/>
+    </dsp:nvGrpSpPr>
+    <dsp:grpSpPr/>
+    <dsp:sp modelId="{B87C5FC3-9DB1-4A88-8F94-78C495906F7A}">
+      <dsp:nvSpPr>
+        <dsp:cNvPr id="0" name=""/>
+        <dsp:cNvSpPr/>
+      </dsp:nvSpPr>
+      <dsp:spPr>
+        <a:xfrm>
+          <a:off x="95195" y="434401"/>
+          <a:ext cx="1586892" cy="902245"/>
+        </a:xfrm>
+        <a:prstGeom prst="roundRect">
+          <a:avLst>
+            <a:gd name="adj" fmla="val 10000"/>
+          </a:avLst>
+        </a:prstGeom>
+        <a:solidFill>
+          <a:schemeClr val="accent1">
+            <a:hueOff val="0"/>
+            <a:satOff val="0"/>
+            <a:lumOff val="0"/>
+            <a:alphaOff val="0"/>
+          </a:schemeClr>
+        </a:solidFill>
+        <a:ln w="15875" cap="rnd" cmpd="sng" algn="ctr">
+          <a:solidFill>
+            <a:schemeClr val="lt1">
+              <a:hueOff val="0"/>
+              <a:satOff val="0"/>
+              <a:lumOff val="0"/>
+              <a:alphaOff val="0"/>
+            </a:schemeClr>
+          </a:solidFill>
+          <a:prstDash val="solid"/>
+        </a:ln>
+        <a:effectLst/>
+      </dsp:spPr>
+      <dsp:style>
+        <a:lnRef idx="2">
+          <a:scrgbClr r="0" g="0" b="0"/>
+        </a:lnRef>
+        <a:fillRef idx="1">
+          <a:scrgbClr r="0" g="0" b="0"/>
+        </a:fillRef>
+        <a:effectRef idx="0">
+          <a:scrgbClr r="0" g="0" b="0"/>
+        </a:effectRef>
+        <a:fontRef idx="minor">
+          <a:schemeClr val="lt1"/>
+        </a:fontRef>
+      </dsp:style>
+      <dsp:txBody>
+        <a:bodyPr spcFirstLastPara="0" vert="horz" wrap="square" lIns="45720" tIns="45720" rIns="45720" bIns="45720" numCol="1" spcCol="1270" anchor="ctr" anchorCtr="0">
+          <a:noAutofit/>
+        </a:bodyPr>
+        <a:lstStyle/>
+        <a:p>
+          <a:pPr lvl="0" algn="ctr" defTabSz="533400">
+            <a:lnSpc>
+              <a:spcPct val="90000"/>
+            </a:lnSpc>
+            <a:spcBef>
+              <a:spcPct val="0"/>
+            </a:spcBef>
+            <a:spcAft>
+              <a:spcPct val="35000"/>
+            </a:spcAft>
+          </a:pPr>
+          <a:r>
+            <a:rPr lang="hu-HU" sz="1200" kern="1200" dirty="0" smtClean="0"/>
+            <a:t>Célok kitűzése</a:t>
+          </a:r>
+          <a:endParaRPr lang="hu-HU" sz="1200" kern="1200" dirty="0"/>
+        </a:p>
+      </dsp:txBody>
+      <dsp:txXfrm>
+        <a:off x="121621" y="460827"/>
+        <a:ext cx="1534040" cy="849393"/>
+      </dsp:txXfrm>
+    </dsp:sp>
+    <dsp:sp modelId="{92367929-9241-4DC0-8BE1-E4EFE43C7E92}">
+      <dsp:nvSpPr>
+        <dsp:cNvPr id="0" name=""/>
+        <dsp:cNvSpPr/>
+      </dsp:nvSpPr>
+      <dsp:spPr>
+        <a:xfrm rot="1419005">
+          <a:off x="1806442" y="1140559"/>
+          <a:ext cx="318784" cy="433400"/>
+        </a:xfrm>
+        <a:prstGeom prst="rightArrow">
+          <a:avLst>
+            <a:gd name="adj1" fmla="val 60000"/>
+            <a:gd name="adj2" fmla="val 50000"/>
+          </a:avLst>
+        </a:prstGeom>
+        <a:solidFill>
+          <a:schemeClr val="accent1">
+            <a:tint val="60000"/>
+            <a:hueOff val="0"/>
+            <a:satOff val="0"/>
+            <a:lumOff val="0"/>
+            <a:alphaOff val="0"/>
+          </a:schemeClr>
+        </a:solidFill>
+        <a:ln>
+          <a:noFill/>
+        </a:ln>
+        <a:effectLst/>
+      </dsp:spPr>
+      <dsp:style>
+        <a:lnRef idx="0">
+          <a:scrgbClr r="0" g="0" b="0"/>
+        </a:lnRef>
+        <a:fillRef idx="1">
+          <a:scrgbClr r="0" g="0" b="0"/>
+        </a:fillRef>
+        <a:effectRef idx="0">
+          <a:scrgbClr r="0" g="0" b="0"/>
+        </a:effectRef>
+        <a:fontRef idx="minor">
+          <a:schemeClr val="lt1"/>
+        </a:fontRef>
+      </dsp:style>
+      <dsp:txBody>
+        <a:bodyPr spcFirstLastPara="0" vert="horz" wrap="square" lIns="0" tIns="0" rIns="0" bIns="0" numCol="1" spcCol="1270" anchor="ctr" anchorCtr="0">
+          <a:noAutofit/>
+        </a:bodyPr>
+        <a:lstStyle/>
+        <a:p>
+          <a:pPr lvl="0" algn="ctr" defTabSz="444500">
+            <a:lnSpc>
+              <a:spcPct val="90000"/>
+            </a:lnSpc>
+            <a:spcBef>
+              <a:spcPct val="0"/>
+            </a:spcBef>
+            <a:spcAft>
+              <a:spcPct val="35000"/>
+            </a:spcAft>
+          </a:pPr>
+          <a:endParaRPr lang="hu-HU" sz="1000" kern="1200"/>
+        </a:p>
+      </dsp:txBody>
+      <dsp:txXfrm>
+        <a:off x="1810458" y="1208057"/>
+        <a:ext cx="223149" cy="260040"/>
+      </dsp:txXfrm>
+    </dsp:sp>
+    <dsp:sp modelId="{97B97CAD-3C50-4A26-8CA7-2B4638821A5B}">
+      <dsp:nvSpPr>
+        <dsp:cNvPr id="0" name=""/>
+        <dsp:cNvSpPr/>
+      </dsp:nvSpPr>
+      <dsp:spPr>
+        <a:xfrm>
+          <a:off x="2233051" y="1332667"/>
+          <a:ext cx="1747582" cy="1048549"/>
+        </a:xfrm>
+        <a:prstGeom prst="roundRect">
+          <a:avLst>
+            <a:gd name="adj" fmla="val 10000"/>
+          </a:avLst>
+        </a:prstGeom>
+        <a:solidFill>
+          <a:schemeClr val="accent1">
+            <a:hueOff val="0"/>
+            <a:satOff val="0"/>
+            <a:lumOff val="0"/>
+            <a:alphaOff val="0"/>
+          </a:schemeClr>
+        </a:solidFill>
+        <a:ln w="15875" cap="rnd" cmpd="sng" algn="ctr">
+          <a:solidFill>
+            <a:schemeClr val="lt1">
+              <a:hueOff val="0"/>
+              <a:satOff val="0"/>
+              <a:lumOff val="0"/>
+              <a:alphaOff val="0"/>
+            </a:schemeClr>
+          </a:solidFill>
+          <a:prstDash val="solid"/>
+        </a:ln>
+        <a:effectLst/>
+      </dsp:spPr>
+      <dsp:style>
+        <a:lnRef idx="2">
+          <a:scrgbClr r="0" g="0" b="0"/>
+        </a:lnRef>
+        <a:fillRef idx="1">
+          <a:scrgbClr r="0" g="0" b="0"/>
+        </a:fillRef>
+        <a:effectRef idx="0">
+          <a:scrgbClr r="0" g="0" b="0"/>
+        </a:effectRef>
+        <a:fontRef idx="minor">
+          <a:schemeClr val="lt1"/>
+        </a:fontRef>
+      </dsp:style>
+      <dsp:txBody>
+        <a:bodyPr spcFirstLastPara="0" vert="horz" wrap="square" lIns="45720" tIns="45720" rIns="45720" bIns="45720" numCol="1" spcCol="1270" anchor="ctr" anchorCtr="0">
+          <a:noAutofit/>
+        </a:bodyPr>
+        <a:lstStyle/>
+        <a:p>
+          <a:pPr lvl="0" algn="ctr" defTabSz="533400">
+            <a:lnSpc>
+              <a:spcPct val="90000"/>
+            </a:lnSpc>
+            <a:spcBef>
+              <a:spcPct val="0"/>
+            </a:spcBef>
+            <a:spcAft>
+              <a:spcPct val="35000"/>
+            </a:spcAft>
+          </a:pPr>
+          <a:r>
+            <a:rPr lang="hu-HU" sz="1200" kern="1200" dirty="0" smtClean="0"/>
+            <a:t>Tervezés (feladatok)</a:t>
+          </a:r>
+          <a:endParaRPr lang="hu-HU" sz="1200" kern="1200" dirty="0"/>
+        </a:p>
+      </dsp:txBody>
+      <dsp:txXfrm>
+        <a:off x="2263762" y="1363378"/>
+        <a:ext cx="1686160" cy="987127"/>
+      </dsp:txXfrm>
+    </dsp:sp>
+    <dsp:sp modelId="{E759324C-057D-4AC7-BC8A-941AB985C9AA}">
+      <dsp:nvSpPr>
+        <dsp:cNvPr id="0" name=""/>
+        <dsp:cNvSpPr/>
+      </dsp:nvSpPr>
+      <dsp:spPr>
+        <a:xfrm rot="1614099">
+          <a:off x="4064724" y="2184435"/>
+          <a:ext cx="229412" cy="433400"/>
+        </a:xfrm>
+        <a:prstGeom prst="rightArrow">
+          <a:avLst>
+            <a:gd name="adj1" fmla="val 60000"/>
+            <a:gd name="adj2" fmla="val 50000"/>
+          </a:avLst>
+        </a:prstGeom>
+        <a:solidFill>
+          <a:schemeClr val="accent1">
+            <a:tint val="60000"/>
+            <a:hueOff val="0"/>
+            <a:satOff val="0"/>
+            <a:lumOff val="0"/>
+            <a:alphaOff val="0"/>
+          </a:schemeClr>
+        </a:solidFill>
+        <a:ln>
+          <a:noFill/>
+        </a:ln>
+        <a:effectLst/>
+      </dsp:spPr>
+      <dsp:style>
+        <a:lnRef idx="0">
+          <a:scrgbClr r="0" g="0" b="0"/>
+        </a:lnRef>
+        <a:fillRef idx="1">
+          <a:scrgbClr r="0" g="0" b="0"/>
+        </a:fillRef>
+        <a:effectRef idx="0">
+          <a:scrgbClr r="0" g="0" b="0"/>
+        </a:effectRef>
+        <a:fontRef idx="minor">
+          <a:schemeClr val="lt1"/>
+        </a:fontRef>
+      </dsp:style>
+      <dsp:txBody>
+        <a:bodyPr spcFirstLastPara="0" vert="horz" wrap="square" lIns="0" tIns="0" rIns="0" bIns="0" numCol="1" spcCol="1270" anchor="ctr" anchorCtr="0">
+          <a:noAutofit/>
+        </a:bodyPr>
+        <a:lstStyle/>
+        <a:p>
+          <a:pPr lvl="0" algn="ctr" defTabSz="444500">
+            <a:lnSpc>
+              <a:spcPct val="90000"/>
+            </a:lnSpc>
+            <a:spcBef>
+              <a:spcPct val="0"/>
+            </a:spcBef>
+            <a:spcAft>
+              <a:spcPct val="35000"/>
+            </a:spcAft>
+          </a:pPr>
+          <a:endParaRPr lang="hu-HU" sz="1000" kern="1200"/>
+        </a:p>
+      </dsp:txBody>
+      <dsp:txXfrm>
+        <a:off x="4068448" y="2255545"/>
+        <a:ext cx="160588" cy="260040"/>
+      </dsp:txXfrm>
+    </dsp:sp>
+    <dsp:sp modelId="{7CB3DF0F-CDDD-4083-AD36-8DCA15821622}">
+      <dsp:nvSpPr>
+        <dsp:cNvPr id="0" name=""/>
+        <dsp:cNvSpPr/>
+      </dsp:nvSpPr>
+      <dsp:spPr>
+        <a:xfrm>
+          <a:off x="4366647" y="2415179"/>
+          <a:ext cx="1747582" cy="1048549"/>
+        </a:xfrm>
+        <a:prstGeom prst="roundRect">
+          <a:avLst>
+            <a:gd name="adj" fmla="val 10000"/>
+          </a:avLst>
+        </a:prstGeom>
+        <a:solidFill>
+          <a:schemeClr val="accent1">
+            <a:hueOff val="0"/>
+            <a:satOff val="0"/>
+            <a:lumOff val="0"/>
+            <a:alphaOff val="0"/>
+          </a:schemeClr>
+        </a:solidFill>
+        <a:ln w="15875" cap="rnd" cmpd="sng" algn="ctr">
+          <a:solidFill>
+            <a:schemeClr val="lt1">
+              <a:hueOff val="0"/>
+              <a:satOff val="0"/>
+              <a:lumOff val="0"/>
+              <a:alphaOff val="0"/>
+            </a:schemeClr>
+          </a:solidFill>
+          <a:prstDash val="solid"/>
+        </a:ln>
+        <a:effectLst/>
+      </dsp:spPr>
+      <dsp:style>
+        <a:lnRef idx="2">
+          <a:scrgbClr r="0" g="0" b="0"/>
+        </a:lnRef>
+        <a:fillRef idx="1">
+          <a:scrgbClr r="0" g="0" b="0"/>
+        </a:fillRef>
+        <a:effectRef idx="0">
+          <a:scrgbClr r="0" g="0" b="0"/>
+        </a:effectRef>
+        <a:fontRef idx="minor">
+          <a:schemeClr val="lt1"/>
+        </a:fontRef>
+      </dsp:style>
+      <dsp:txBody>
+        <a:bodyPr spcFirstLastPara="0" vert="horz" wrap="square" lIns="45720" tIns="45720" rIns="45720" bIns="45720" numCol="1" spcCol="1270" anchor="ctr" anchorCtr="0">
+          <a:noAutofit/>
+        </a:bodyPr>
+        <a:lstStyle/>
+        <a:p>
+          <a:pPr lvl="0" algn="ctr" defTabSz="533400">
+            <a:lnSpc>
+              <a:spcPct val="90000"/>
+            </a:lnSpc>
+            <a:spcBef>
+              <a:spcPct val="0"/>
+            </a:spcBef>
+            <a:spcAft>
+              <a:spcPct val="35000"/>
+            </a:spcAft>
+          </a:pPr>
+          <a:r>
+            <a:rPr lang="hu-HU" sz="1200" kern="1200" dirty="0" smtClean="0"/>
+            <a:t>Megvalósítás</a:t>
+          </a:r>
+          <a:endParaRPr lang="hu-HU" sz="1200" kern="1200" dirty="0"/>
+        </a:p>
+      </dsp:txBody>
+      <dsp:txXfrm>
+        <a:off x="4397358" y="2445890"/>
+        <a:ext cx="1686160" cy="987127"/>
+      </dsp:txXfrm>
+    </dsp:sp>
+    <dsp:sp modelId="{BA076D04-DB9D-4DDA-B82F-AB5D2C6DB14B}">
+      <dsp:nvSpPr>
+        <dsp:cNvPr id="0" name=""/>
+        <dsp:cNvSpPr/>
+      </dsp:nvSpPr>
+      <dsp:spPr>
+        <a:xfrm rot="1351021">
+          <a:off x="6238630" y="3201415"/>
+          <a:ext cx="312860" cy="433400"/>
+        </a:xfrm>
+        <a:prstGeom prst="rightArrow">
+          <a:avLst>
+            <a:gd name="adj1" fmla="val 60000"/>
+            <a:gd name="adj2" fmla="val 50000"/>
+          </a:avLst>
+        </a:prstGeom>
+        <a:solidFill>
+          <a:schemeClr val="accent1">
+            <a:tint val="60000"/>
+            <a:hueOff val="0"/>
+            <a:satOff val="0"/>
+            <a:lumOff val="0"/>
+            <a:alphaOff val="0"/>
+          </a:schemeClr>
+        </a:solidFill>
+        <a:ln>
+          <a:noFill/>
+        </a:ln>
+        <a:effectLst/>
+      </dsp:spPr>
+      <dsp:style>
+        <a:lnRef idx="0">
+          <a:scrgbClr r="0" g="0" b="0"/>
+        </a:lnRef>
+        <a:fillRef idx="1">
+          <a:scrgbClr r="0" g="0" b="0"/>
+        </a:fillRef>
+        <a:effectRef idx="0">
+          <a:scrgbClr r="0" g="0" b="0"/>
+        </a:effectRef>
+        <a:fontRef idx="minor">
+          <a:schemeClr val="lt1"/>
+        </a:fontRef>
+      </dsp:style>
+      <dsp:txBody>
+        <a:bodyPr spcFirstLastPara="0" vert="horz" wrap="square" lIns="0" tIns="0" rIns="0" bIns="0" numCol="1" spcCol="1270" anchor="ctr" anchorCtr="0">
+          <a:noAutofit/>
+        </a:bodyPr>
+        <a:lstStyle/>
+        <a:p>
+          <a:pPr lvl="0" algn="ctr" defTabSz="444500">
+            <a:lnSpc>
+              <a:spcPct val="90000"/>
+            </a:lnSpc>
+            <a:spcBef>
+              <a:spcPct val="0"/>
+            </a:spcBef>
+            <a:spcAft>
+              <a:spcPct val="35000"/>
+            </a:spcAft>
+          </a:pPr>
+          <a:endParaRPr lang="hu-HU" sz="1000" kern="1200" dirty="0"/>
+        </a:p>
+      </dsp:txBody>
+      <dsp:txXfrm>
+        <a:off x="6242208" y="3270123"/>
+        <a:ext cx="219002" cy="260040"/>
+      </dsp:txXfrm>
+    </dsp:sp>
+    <dsp:sp modelId="{010F3DCD-B85D-422E-89E8-6EB63947AD4A}">
+      <dsp:nvSpPr>
+        <dsp:cNvPr id="0" name=""/>
+        <dsp:cNvSpPr/>
+      </dsp:nvSpPr>
+      <dsp:spPr>
+        <a:xfrm>
+          <a:off x="6659531" y="3365720"/>
+          <a:ext cx="1747582" cy="1048549"/>
+        </a:xfrm>
+        <a:prstGeom prst="roundRect">
+          <a:avLst>
+            <a:gd name="adj" fmla="val 10000"/>
+          </a:avLst>
+        </a:prstGeom>
+        <a:solidFill>
+          <a:schemeClr val="accent1">
+            <a:hueOff val="0"/>
+            <a:satOff val="0"/>
+            <a:lumOff val="0"/>
+            <a:alphaOff val="0"/>
+          </a:schemeClr>
+        </a:solidFill>
+        <a:ln w="15875" cap="rnd" cmpd="sng" algn="ctr">
+          <a:solidFill>
+            <a:schemeClr val="lt1">
+              <a:hueOff val="0"/>
+              <a:satOff val="0"/>
+              <a:lumOff val="0"/>
+              <a:alphaOff val="0"/>
+            </a:schemeClr>
+          </a:solidFill>
+          <a:prstDash val="solid"/>
+        </a:ln>
+        <a:effectLst/>
+      </dsp:spPr>
+      <dsp:style>
+        <a:lnRef idx="2">
+          <a:scrgbClr r="0" g="0" b="0"/>
+        </a:lnRef>
+        <a:fillRef idx="1">
+          <a:scrgbClr r="0" g="0" b="0"/>
+        </a:fillRef>
+        <a:effectRef idx="0">
+          <a:scrgbClr r="0" g="0" b="0"/>
+        </a:effectRef>
+        <a:fontRef idx="minor">
+          <a:schemeClr val="lt1"/>
+        </a:fontRef>
+      </dsp:style>
+      <dsp:txBody>
+        <a:bodyPr spcFirstLastPara="0" vert="horz" wrap="square" lIns="45720" tIns="45720" rIns="45720" bIns="45720" numCol="1" spcCol="1270" anchor="ctr" anchorCtr="0">
+          <a:noAutofit/>
+        </a:bodyPr>
+        <a:lstStyle/>
+        <a:p>
+          <a:pPr lvl="0" algn="ctr" defTabSz="533400">
+            <a:lnSpc>
+              <a:spcPct val="90000"/>
+            </a:lnSpc>
+            <a:spcBef>
+              <a:spcPct val="0"/>
+            </a:spcBef>
+            <a:spcAft>
+              <a:spcPct val="35000"/>
+            </a:spcAft>
+          </a:pPr>
+          <a:r>
+            <a:rPr lang="hu-HU" sz="1200" kern="1200" dirty="0" smtClean="0"/>
+            <a:t>Tesztelés/ellenőrzés</a:t>
+          </a:r>
+          <a:endParaRPr lang="hu-HU" sz="1200" kern="1200" dirty="0"/>
+        </a:p>
+      </dsp:txBody>
+      <dsp:txXfrm>
+        <a:off x="6690242" y="3396431"/>
+        <a:ext cx="1686160" cy="987127"/>
+      </dsp:txXfrm>
+    </dsp:sp>
+    <dsp:sp modelId="{F60DA35A-D842-4BEF-B428-2768A2F211ED}">
+      <dsp:nvSpPr>
+        <dsp:cNvPr id="0" name=""/>
+        <dsp:cNvSpPr/>
+      </dsp:nvSpPr>
+      <dsp:spPr>
+        <a:xfrm rot="1562091">
+          <a:off x="8521399" y="4230771"/>
+          <a:ext cx="306313" cy="433400"/>
+        </a:xfrm>
+        <a:prstGeom prst="rightArrow">
+          <a:avLst>
+            <a:gd name="adj1" fmla="val 60000"/>
+            <a:gd name="adj2" fmla="val 50000"/>
+          </a:avLst>
+        </a:prstGeom>
+        <a:solidFill>
+          <a:schemeClr val="accent1">
+            <a:tint val="60000"/>
+            <a:hueOff val="0"/>
+            <a:satOff val="0"/>
+            <a:lumOff val="0"/>
+            <a:alphaOff val="0"/>
+          </a:schemeClr>
+        </a:solidFill>
+        <a:ln>
+          <a:noFill/>
+        </a:ln>
+        <a:effectLst/>
+      </dsp:spPr>
+      <dsp:style>
+        <a:lnRef idx="0">
+          <a:scrgbClr r="0" g="0" b="0"/>
+        </a:lnRef>
+        <a:fillRef idx="1">
+          <a:scrgbClr r="0" g="0" b="0"/>
+        </a:fillRef>
+        <a:effectRef idx="0">
+          <a:scrgbClr r="0" g="0" b="0"/>
+        </a:effectRef>
+        <a:fontRef idx="minor">
+          <a:schemeClr val="lt1"/>
+        </a:fontRef>
+      </dsp:style>
+      <dsp:txBody>
+        <a:bodyPr spcFirstLastPara="0" vert="horz" wrap="square" lIns="0" tIns="0" rIns="0" bIns="0" numCol="1" spcCol="1270" anchor="ctr" anchorCtr="0">
+          <a:noAutofit/>
+        </a:bodyPr>
+        <a:lstStyle/>
+        <a:p>
+          <a:pPr lvl="0" algn="ctr" defTabSz="444500">
+            <a:lnSpc>
+              <a:spcPct val="90000"/>
+            </a:lnSpc>
+            <a:spcBef>
+              <a:spcPct val="0"/>
+            </a:spcBef>
+            <a:spcAft>
+              <a:spcPct val="35000"/>
+            </a:spcAft>
+          </a:pPr>
+          <a:endParaRPr lang="hu-HU" sz="1000" kern="1200"/>
+        </a:p>
+      </dsp:txBody>
+      <dsp:txXfrm>
+        <a:off x="8526061" y="4297284"/>
+        <a:ext cx="214419" cy="260040"/>
+      </dsp:txXfrm>
+    </dsp:sp>
+    <dsp:sp modelId="{E6B72C96-3ACE-4E7D-989C-ECFD7E3A2A87}">
+      <dsp:nvSpPr>
+        <dsp:cNvPr id="0" name=""/>
+        <dsp:cNvSpPr/>
+      </dsp:nvSpPr>
+      <dsp:spPr>
+        <a:xfrm>
+          <a:off x="8926418" y="4473062"/>
+          <a:ext cx="1747582" cy="1048549"/>
+        </a:xfrm>
+        <a:prstGeom prst="roundRect">
+          <a:avLst>
+            <a:gd name="adj" fmla="val 10000"/>
+          </a:avLst>
+        </a:prstGeom>
+        <a:solidFill>
+          <a:schemeClr val="accent1">
+            <a:hueOff val="0"/>
+            <a:satOff val="0"/>
+            <a:lumOff val="0"/>
+            <a:alphaOff val="0"/>
+          </a:schemeClr>
+        </a:solidFill>
+        <a:ln w="15875" cap="rnd" cmpd="sng" algn="ctr">
+          <a:solidFill>
+            <a:schemeClr val="lt1">
+              <a:hueOff val="0"/>
+              <a:satOff val="0"/>
+              <a:lumOff val="0"/>
+              <a:alphaOff val="0"/>
+            </a:schemeClr>
+          </a:solidFill>
+          <a:prstDash val="solid"/>
+        </a:ln>
+        <a:effectLst/>
+      </dsp:spPr>
+      <dsp:style>
+        <a:lnRef idx="2">
+          <a:scrgbClr r="0" g="0" b="0"/>
+        </a:lnRef>
+        <a:fillRef idx="1">
+          <a:scrgbClr r="0" g="0" b="0"/>
+        </a:fillRef>
+        <a:effectRef idx="0">
+          <a:scrgbClr r="0" g="0" b="0"/>
+        </a:effectRef>
+        <a:fontRef idx="minor">
+          <a:schemeClr val="lt1"/>
+        </a:fontRef>
+      </dsp:style>
+      <dsp:txBody>
+        <a:bodyPr spcFirstLastPara="0" vert="horz" wrap="square" lIns="45720" tIns="45720" rIns="45720" bIns="45720" numCol="1" spcCol="1270" anchor="ctr" anchorCtr="0">
+          <a:noAutofit/>
+        </a:bodyPr>
+        <a:lstStyle/>
+        <a:p>
+          <a:pPr lvl="0" algn="ctr" defTabSz="533400">
+            <a:lnSpc>
+              <a:spcPct val="90000"/>
+            </a:lnSpc>
+            <a:spcBef>
+              <a:spcPct val="0"/>
+            </a:spcBef>
+            <a:spcAft>
+              <a:spcPct val="35000"/>
+            </a:spcAft>
+          </a:pPr>
+          <a:r>
+            <a:rPr lang="hu-HU" sz="1200" kern="1200" dirty="0" smtClean="0"/>
+            <a:t>Dokumentáció/zárás</a:t>
+          </a:r>
+          <a:endParaRPr lang="hu-HU" sz="1200" kern="1200" dirty="0"/>
+        </a:p>
+      </dsp:txBody>
+      <dsp:txXfrm>
+        <a:off x="8957129" y="4503773"/>
+        <a:ext cx="1686160" cy="987127"/>
+      </dsp:txXfrm>
+    </dsp:sp>
+  </dsp:spTree>
+</dsp:drawing>
+</file>
+
+<file path=ppt/diagrams/layout1.xml><?xml version="1.0" encoding="utf-8"?>
+<dgm:layoutDef xmlns:dgm="http://schemas.openxmlformats.org/drawingml/2006/diagram" xmlns:a="http://schemas.openxmlformats.org/drawingml/2006/main" uniqueId="urn:microsoft.com/office/officeart/2005/8/layout/process1">
+  <dgm:title val=""/>
+  <dgm:desc val=""/>
+  <dgm:catLst>
+    <dgm:cat type="process" pri="1000"/>
+    <dgm:cat type="convert" pri="15000"/>
+  </dgm:catLst>
+  <dgm:sampData useDef="1">
+    <dgm:dataModel>
+      <dgm:ptLst/>
+      <dgm:bg/>
+      <dgm:whole/>
+    </dgm:dataModel>
+  </dgm:sampData>
+  <dgm:styleData>
+    <dgm:dataModel>
+      <dgm:ptLst>
+        <dgm:pt modelId="0" type="doc"/>
+        <dgm:pt modelId="1"/>
+        <dgm:pt modelId="2"/>
+      </dgm:ptLst>
+      <dgm:cxnLst>
+        <dgm:cxn modelId="3" srcId="0" destId="1" srcOrd="0" destOrd="0"/>
+        <dgm:cxn modelId="4" srcId="0" destId="2" srcOrd="1" destOrd="0"/>
+      </dgm:cxnLst>
+      <dgm:bg/>
+      <dgm:whole/>
+    </dgm:dataModel>
+  </dgm:styleData>
+  <dgm:clrData>
+    <dgm:dataModel>
+      <dgm:ptLst>
+        <dgm:pt modelId="0" type="doc"/>
+        <dgm:pt modelId="1"/>
+        <dgm:pt modelId="2"/>
+        <dgm:pt modelId="3"/>
+        <dgm:pt modelId="4"/>
+      </dgm:ptLst>
+      <dgm:cxnLst>
+        <dgm:cxn modelId="5" srcId="0" destId="1" srcOrd="0" destOrd="0"/>
+        <dgm:cxn modelId="6" srcId="0" destId="2" srcOrd="1" destOrd="0"/>
+        <dgm:cxn modelId="7" srcId="0" destId="3" srcOrd="2" destOrd="0"/>
+        <dgm:cxn modelId="8" srcId="0" destId="4" srcOrd="3" destOrd="0"/>
+      </dgm:cxnLst>
+      <dgm:bg/>
+      <dgm:whole/>
+    </dgm:dataModel>
+  </dgm:clrData>
+  <dgm:layoutNode name="Name0">
+    <dgm:varLst>
+      <dgm:dir/>
+      <dgm:resizeHandles val="exact"/>
+    </dgm:varLst>
+    <dgm:choose name="Name1">
+      <dgm:if name="Name2" func="var" arg="dir" op="equ" val="norm">
+        <dgm:alg type="lin"/>
+      </dgm:if>
+      <dgm:else name="Name3">
+        <dgm:alg type="lin">
+          <dgm:param type="linDir" val="fromR"/>
+        </dgm:alg>
+      </dgm:else>
+    </dgm:choose>
+    <dgm:shape xmlns:r="http://schemas.openxmlformats.org/officeDocument/2006/relationships" r:blip="">
+      <dgm:adjLst/>
+    </dgm:shape>
+    <dgm:presOf/>
+    <dgm:constrLst>
+      <dgm:constr type="w" for="ch" ptType="node" refType="w"/>
+      <dgm:constr type="h" for="ch" ptType="node" op="equ"/>
+      <dgm:constr type="primFontSz" for="ch" ptType="node" op="equ" val="65"/>
+      <dgm:constr type="w" for="ch" ptType="sibTrans" refType="w" refFor="ch" refPtType="node" op="equ" fact="0.4"/>
+      <dgm:constr type="h" for="ch" ptType="sibTrans" op="equ"/>
+      <dgm:constr type="primFontSz" for="des" forName="connectorText" op="equ" val="55"/>
+      <dgm:constr type="primFontSz" for="des" forName="connectorText" refType="primFontSz" refFor="ch" refPtType="node" op="lte" fact="0.8"/>
+    </dgm:constrLst>
+    <dgm:ruleLst/>
+    <dgm:forEach name="nodesForEach" axis="ch" ptType="node">
+      <dgm:layoutNode name="node">
+        <dgm:varLst>
+          <dgm:bulletEnabled val="1"/>
+        </dgm:varLst>
+        <dgm:alg type="tx"/>
+        <dgm:shape xmlns:r="http://schemas.openxmlformats.org/officeDocument/2006/relationships" type="roundRect" r:blip="">
+          <dgm:adjLst>
+            <dgm:adj idx="1" val="0.1"/>
+          </dgm:adjLst>
+        </dgm:shape>
+        <dgm:presOf axis="desOrSelf" ptType="node"/>
+        <dgm:constrLst>
+          <dgm:constr type="h" refType="w" fact="0.6"/>
+          <dgm:constr type="tMarg" refType="primFontSz" fact="0.3"/>
+          <dgm:constr type="bMarg" refType="primFontSz" fact="0.3"/>
+          <dgm:constr type="lMarg" refType="primFontSz" fact="0.3"/>
+          <dgm:constr type="rMarg" refType="primFontSz" fact="0.3"/>
+        </dgm:constrLst>
+        <dgm:ruleLst>
+          <dgm:rule type="primFontSz" val="18" fact="NaN" max="NaN"/>
+          <dgm:rule type="h" val="NaN" fact="1.5" max="NaN"/>
+          <dgm:rule type="primFontSz" val="5" fact="NaN" max="NaN"/>
+          <dgm:rule type="h" val="INF" fact="NaN" max="NaN"/>
+        </dgm:ruleLst>
+      </dgm:layoutNode>
+      <dgm:forEach name="sibTransForEach" axis="followSib" ptType="sibTrans" cnt="1">
+        <dgm:layoutNode name="sibTrans">
+          <dgm:alg type="conn">
+            <dgm:param type="begPts" val="auto"/>
+            <dgm:param type="endPts" val="auto"/>
+          </dgm:alg>
+          <dgm:shape xmlns:r="http://schemas.openxmlformats.org/officeDocument/2006/relationships" type="conn" r:blip="">
+            <dgm:adjLst/>
+          </dgm:shape>
+          <dgm:presOf axis="self"/>
+          <dgm:constrLst>
+            <dgm:constr type="h" refType="w" fact="0.62"/>
+            <dgm:constr type="connDist"/>
+            <dgm:constr type="begPad" refType="connDist" fact="0.25"/>
+            <dgm:constr type="endPad" refType="connDist" fact="0.22"/>
+          </dgm:constrLst>
+          <dgm:ruleLst/>
+          <dgm:layoutNode name="connectorText">
+            <dgm:alg type="tx">
+              <dgm:param type="autoTxRot" val="grav"/>
+            </dgm:alg>
+            <dgm:shape xmlns:r="http://schemas.openxmlformats.org/officeDocument/2006/relationships" type="conn" r:blip="" hideGeom="1">
+              <dgm:adjLst/>
+            </dgm:shape>
+            <dgm:presOf axis="self"/>
+            <dgm:constrLst>
+              <dgm:constr type="lMarg"/>
+              <dgm:constr type="rMarg"/>
+              <dgm:constr type="tMarg"/>
+              <dgm:constr type="bMarg"/>
+            </dgm:constrLst>
+            <dgm:ruleLst>
+              <dgm:rule type="primFontSz" val="5" fact="NaN" max="NaN"/>
+            </dgm:ruleLst>
+          </dgm:layoutNode>
+        </dgm:layoutNode>
+      </dgm:forEach>
+    </dgm:forEach>
+  </dgm:layoutNode>
+</dgm:layoutDef>
+</file>
+
+<file path=ppt/diagrams/quickStyle1.xml><?xml version="1.0" encoding="utf-8"?>
+<dgm:styleDef xmlns:dgm="http://schemas.openxmlformats.org/drawingml/2006/diagram" xmlns:a="http://schemas.openxmlformats.org/drawingml/2006/main" uniqueId="urn:microsoft.com/office/officeart/2005/8/quickstyle/simple1">
+  <dgm:title val=""/>
+  <dgm:desc val=""/>
+  <dgm:catLst>
+    <dgm:cat type="simple" pri="10100"/>
+  </dgm:catLst>
+  <dgm:scene3d>
+    <a:camera prst="orthographicFront"/>
+    <a:lightRig rig="threePt" dir="t"/>
+  </dgm:scene3d>
+  <dgm:styleLbl name="node0">
+    <dgm:scene3d>
+      <a:camera prst="orthographicFront"/>
+      <a:lightRig rig="threePt" dir="t"/>
+    </dgm:scene3d>
+    <dgm:sp3d/>
+    <dgm:txPr/>
+    <dgm:style>
+      <a:lnRef idx="2">
+        <a:scrgbClr r="0" g="0" b="0"/>
+      </a:lnRef>
+      <a:fillRef idx="1">
+        <a:scrgbClr r="0" g="0" b="0"/>
+      </a:fillRef>
+      <a:effectRef idx="0">
+        <a:scrgbClr r="0" g="0" b="0"/>
+      </a:effectRef>
+      <a:fontRef idx="minor">
+        <a:schemeClr val="lt1"/>
+      </a:fontRef>
+    </dgm:style>
+  </dgm:styleLbl>
+  <dgm:styleLbl name="lnNode1">
+    <dgm:scene3d>
+      <a:camera prst="orthographicFront"/>
+      <a:lightRig rig="threePt" dir="t"/>
+    </dgm:scene3d>
+    <dgm:sp3d/>
+    <dgm:txPr/>
+    <dgm:style>
+      <a:lnRef idx="2">
+        <a:scrgbClr r="0" g="0" b="0"/>
+      </a:lnRef>
+      <a:fillRef idx="1">
+        <a:scrgbClr r="0" g="0" b="0"/>
+      </a:fillRef>
+      <a:effectRef idx="0">
+        <a:scrgbClr r="0" g="0" b="0"/>
+      </a:effectRef>
+      <a:fontRef idx="minor">
+        <a:schemeClr val="lt1"/>
+      </a:fontRef>
+    </dgm:style>
+  </dgm:styleLbl>
+  <dgm:styleLbl name="vennNode1">
+    <dgm:scene3d>
+      <a:camera prst="orthographicFront"/>
+      <a:lightRig rig="threePt" dir="t"/>
+    </dgm:scene3d>
+    <dgm:sp3d/>
+    <dgm:txPr/>
+    <dgm:style>
+      <a:lnRef idx="2">
+        <a:scrgbClr r="0" g="0" b="0"/>
+      </a:lnRef>
+      <a:fillRef idx="1">
+        <a:scrgbClr r="0" g="0" b="0"/>
+      </a:fillRef>
+      <a:effectRef idx="0">
+        <a:scrgbClr r="0" g="0" b="0"/>
+      </a:effectRef>
+      <a:fontRef idx="minor">
+        <a:schemeClr val="tx1"/>
+      </a:fontRef>
+    </dgm:style>
+  </dgm:styleLbl>
+  <dgm:styleLbl name="alignNode1">
+    <dgm:scene3d>
+      <a:camera prst="orthographicFront"/>
+      <a:lightRig rig="threePt" dir="t"/>
+    </dgm:scene3d>
+    <dgm:sp3d/>
+    <dgm:txPr/>
+    <dgm:style>
+      <a:lnRef idx="2">
+        <a:scrgbClr r="0" g="0" b="0"/>
+      </a:lnRef>
+      <a:fillRef idx="1">
+        <a:scrgbClr r="0" g="0" b="0"/>
+      </a:fillRef>
+      <a:effectRef idx="0">
+        <a:scrgbClr r="0" g="0" b="0"/>
+      </a:effectRef>
+      <a:fontRef idx="minor">
+        <a:schemeClr val="lt1"/>
+      </a:fontRef>
+    </dgm:style>
+  </dgm:styleLbl>
+  <dgm:styleLbl name="node1">
+    <dgm:scene3d>
+      <a:camera prst="orthographicFront"/>
+      <a:lightRig rig="threePt" dir="t"/>
+    </dgm:scene3d>
+    <dgm:sp3d/>
+    <dgm:txPr/>
+    <dgm:style>
+      <a:lnRef idx="2">
+        <a:scrgbClr r="0" g="0" b="0"/>
+      </a:lnRef>
+      <a:fillRef idx="1">
+        <a:scrgbClr r="0" g="0" b="0"/>
+      </a:fillRef>
+      <a:effectRef idx="0">
+        <a:scrgbClr r="0" g="0" b="0"/>
+      </a:effectRef>
+      <a:fontRef idx="minor">
+        <a:schemeClr val="lt1"/>
+      </a:fontRef>
+    </dgm:style>
+  </dgm:styleLbl>
+  <dgm:styleLbl name="node2">
+    <dgm:scene3d>
+      <a:camera prst="orthographicFront"/>
+      <a:lightRig rig="threePt" dir="t"/>
+    </dgm:scene3d>
+    <dgm:sp3d/>
+    <dgm:txPr/>
+    <dgm:style>
+      <a:lnRef idx="2">
+        <a:scrgbClr r="0" g="0" b="0"/>
+      </a:lnRef>
+      <a:fillRef idx="1">
+        <a:scrgbClr r="0" g="0" b="0"/>
+      </a:fillRef>
+      <a:effectRef idx="0">
+        <a:scrgbClr r="0" g="0" b="0"/>
+      </a:effectRef>
+      <a:fontRef idx="minor">
+        <a:schemeClr val="lt1"/>
+      </a:fontRef>
+    </dgm:style>
+  </dgm:styleLbl>
+  <dgm:styleLbl name="node3">
+    <dgm:scene3d>
+      <a:camera prst="orthographicFront"/>
+      <a:lightRig rig="threePt" dir="t"/>
+    </dgm:scene3d>
+    <dgm:sp3d/>
+    <dgm:txPr/>
+    <dgm:style>
+      <a:lnRef idx="2">
+        <a:scrgbClr r="0" g="0" b="0"/>
+      </a:lnRef>
+      <a:fillRef idx="1">
+        <a:scrgbClr r="0" g="0" b="0"/>
+      </a:fillRef>
+      <a:effectRef idx="0">
+        <a:scrgbClr r="0" g="0" b="0"/>
+      </a:effectRef>
+      <a:fontRef idx="minor">
+        <a:schemeClr val="lt1"/>
+      </a:fontRef>
+    </dgm:style>
+  </dgm:styleLbl>
+  <dgm:styleLbl name="node4">
+    <dgm:scene3d>
+      <a:camera prst="orthographicFront"/>
+      <a:lightRig rig="threePt" dir="t"/>
+    </dgm:scene3d>
+    <dgm:sp3d/>
+    <dgm:txPr/>
+    <dgm:style>
+      <a:lnRef idx="2">
+        <a:scrgbClr r="0" g="0" b="0"/>
+      </a:lnRef>
+      <a:fillRef idx="1">
+        <a:scrgbClr r="0" g="0" b="0"/>
+      </a:fillRef>
+      <a:effectRef idx="0">
+        <a:scrgbClr r="0" g="0" b="0"/>
+      </a:effectRef>
+      <a:fontRef idx="minor">
+        <a:schemeClr val="lt1"/>
+      </a:fontRef>
+    </dgm:style>
+  </dgm:styleLbl>
+  <dgm:styleLbl name="fgImgPlace1">
+    <dgm:scene3d>
+      <a:camera prst="orthographicFront"/>
+      <a:lightRig rig="threePt" dir="t"/>
+    </dgm:scene3d>
+    <dgm:sp3d/>
+    <dgm:txPr/>
+    <dgm:style>
+      <a:lnRef idx="2">
+        <a:scrgbClr r="0" g="0" b="0"/>
+      </a:lnRef>
+      <a:fillRef idx="1">
+        <a:scrgbClr r="0" g="0" b="0"/>
+      </a:fillRef>
+      <a:effectRef idx="0">
+        <a:scrgbClr r="0" g="0" b="0"/>
+      </a:effectRef>
+      <a:fontRef idx="minor"/>
+    </dgm:style>
+  </dgm:styleLbl>
+  <dgm:styleLbl name="alignImgPlace1">
+    <dgm:scene3d>
+      <a:camera prst="orthographicFront"/>
+      <a:lightRig rig="threePt" dir="t"/>
+    </dgm:scene3d>
+    <dgm:sp3d/>
+    <dgm:txPr/>
+    <dgm:style>
+      <a:lnRef idx="2">
+        <a:scrgbClr r="0" g="0" b="0"/>
+      </a:lnRef>
+      <a:fillRef idx="1">
+        <a:scrgbClr r="0" g="0" b="0"/>
+      </a:fillRef>
+      <a:effectRef idx="0">
+        <a:scrgbClr r="0" g="0" b="0"/>
+      </a:effectRef>
+      <a:fontRef idx="minor"/>
+    </dgm:style>
+  </dgm:styleLbl>
+  <dgm:styleLbl name="bgImgPlace1">
+    <dgm:scene3d>
+      <a:camera prst="orthographicFront"/>
+      <a:lightRig rig="threePt" dir="t"/>
+    </dgm:scene3d>
+    <dgm:sp3d/>
+    <dgm:txPr/>
+    <dgm:style>
+      <a:lnRef idx="2">
+        <a:scrgbClr r="0" g="0" b="0"/>
+      </a:lnRef>
+      <a:fillRef idx="1">
+        <a:scrgbClr r="0" g="0" b="0"/>
+      </a:fillRef>
+      <a:effectRef idx="0">
+        <a:scrgbClr r="0" g="0" b="0"/>
+      </a:effectRef>
+      <a:fontRef idx="minor"/>
+    </dgm:style>
+  </dgm:styleLbl>
+  <dgm:styleLbl name="sibTrans2D1">
+    <dgm:scene3d>
+      <a:camera prst="orthographicFront"/>
+      <a:lightRig rig="threePt" dir="t"/>
+    </dgm:scene3d>
+    <dgm:sp3d/>
+    <dgm:txPr/>
+    <dgm:style>
+      <a:lnRef idx="0">
+        <a:scrgbClr r="0" g="0" b="0"/>
+      </a:lnRef>
+      <a:fillRef idx="1">
+        <a:scrgbClr r="0" g="0" b="0"/>
+      </a:fillRef>
+      <a:effectRef idx="0">
+        <a:scrgbClr r="0" g="0" b="0"/>
+      </a:effectRef>
+      <a:fontRef idx="minor">
+        <a:schemeClr val="lt1"/>
+      </a:fontRef>
+    </dgm:style>
+  </dgm:styleLbl>
+  <dgm:styleLbl name="fgSibTrans2D1">
+    <dgm:scene3d>
+      <a:camera prst="orthographicFront"/>
+      <a:lightRig rig="threePt" dir="t"/>
+    </dgm:scene3d>
+    <dgm:sp3d/>
+    <dgm:txPr/>
+    <dgm:style>
+      <a:lnRef idx="0">
+        <a:scrgbClr r="0" g="0" b="0"/>
+      </a:lnRef>
+      <a:fillRef idx="1">
+        <a:scrgbClr r="0" g="0" b="0"/>
+      </a:fillRef>
+      <a:effectRef idx="0">
+        <a:scrgbClr r="0" g="0" b="0"/>
+      </a:effectRef>
+      <a:fontRef idx="minor">
+        <a:schemeClr val="lt1"/>
+      </a:fontRef>
+    </dgm:style>
+  </dgm:styleLbl>
+  <dgm:styleLbl name="bgSibTrans2D1">
+    <dgm:scene3d>
+      <a:camera prst="orthographicFront"/>
+      <a:lightRig rig="threePt" dir="t"/>
+    </dgm:scene3d>
+    <dgm:sp3d/>
+    <dgm:txPr/>
+    <dgm:style>
+      <a:lnRef idx="0">
+        <a:scrgbClr r="0" g="0" b="0"/>
+      </a:lnRef>
+      <a:fillRef idx="1">
+        <a:scrgbClr r="0" g="0" b="0"/>
+      </a:fillRef>
+      <a:effectRef idx="0">
+        <a:scrgbClr r="0" g="0" b="0"/>
+      </a:effectRef>
+      <a:fontRef idx="minor">
+        <a:schemeClr val="lt1"/>
+      </a:fontRef>
+    </dgm:style>
+  </dgm:styleLbl>
+  <dgm:styleLbl name="sibTrans1D1">
+    <dgm:scene3d>
+      <a:camera prst="orthographicFront"/>
+      <a:lightRig rig="threePt" dir="t"/>
+    </dgm:scene3d>
+    <dgm:sp3d/>
+    <dgm:txPr/>
+    <dgm:style>
+      <a:lnRef idx="1">
+        <a:scrgbClr r="0" g="0" b="0"/>
+      </a:lnRef>
+      <a:fillRef idx="0">
+        <a:scrgbClr r="0" g="0" b="0"/>
+      </a:fillRef>
+      <a:effectRef idx="0">
+        <a:scrgbClr r="0" g="0" b="0"/>
+      </a:effectRef>
+      <a:fontRef idx="minor"/>
+    </dgm:style>
+  </dgm:styleLbl>
+  <dgm:styleLbl name="callout">
+    <dgm:scene3d>
+      <a:camera prst="orthographicFront"/>
+      <a:lightRig rig="threePt" dir="t"/>
+    </dgm:scene3d>
+    <dgm:sp3d/>
+    <dgm:txPr/>
+    <dgm:style>
+      <a:lnRef idx="2">
+        <a:scrgbClr r="0" g="0" b="0"/>
+      </a:lnRef>
+      <a:fillRef idx="1">
+        <a:scrgbClr r="0" g="0" b="0"/>
+      </a:fillRef>
+      <a:effectRef idx="0">
+        <a:scrgbClr r="0" g="0" b="0"/>
+      </a:effectRef>
+      <a:fontRef idx="minor"/>
+    </dgm:style>
+  </dgm:styleLbl>
+  <dgm:styleLbl name="asst0">
+    <dgm:scene3d>
+      <a:camera prst="orthographicFront"/>
+      <a:lightRig rig="threePt" dir="t"/>
+    </dgm:scene3d>
+    <dgm:sp3d/>
+    <dgm:txPr/>
+    <dgm:style>
+      <a:lnRef idx="2">
+        <a:scrgbClr r="0" g="0" b="0"/>
+      </a:lnRef>
+      <a:fillRef idx="1">
+        <a:scrgbClr r="0" g="0" b="0"/>
+      </a:fillRef>
+      <a:effectRef idx="0">
+        <a:scrgbClr r="0" g="0" b="0"/>
+      </a:effectRef>
+      <a:fontRef idx="minor">
+        <a:schemeClr val="lt1"/>
+      </a:fontRef>
+    </dgm:style>
+  </dgm:styleLbl>
+  <dgm:styleLbl name="asst1">
+    <dgm:scene3d>
+      <a:camera prst="orthographicFront"/>
+      <a:lightRig rig="threePt" dir="t"/>
+    </dgm:scene3d>
+    <dgm:sp3d/>
+    <dgm:txPr/>
+    <dgm:style>
+      <a:lnRef idx="2">
+        <a:scrgbClr r="0" g="0" b="0"/>
+      </a:lnRef>
+      <a:fillRef idx="1">
+        <a:scrgbClr r="0" g="0" b="0"/>
+      </a:fillRef>
+      <a:effectRef idx="0">
+        <a:scrgbClr r="0" g="0" b="0"/>
+      </a:effectRef>
+      <a:fontRef idx="minor">
+        <a:schemeClr val="lt1"/>
+      </a:fontRef>
+    </dgm:style>
+  </dgm:styleLbl>
+  <dgm:styleLbl name="asst2">
+    <dgm:scene3d>
+      <a:camera prst="orthographicFront"/>
+      <a:lightRig rig="threePt" dir="t"/>
+    </dgm:scene3d>
+    <dgm:sp3d/>
+    <dgm:txPr/>
+    <dgm:style>
+      <a:lnRef idx="2">
+        <a:scrgbClr r="0" g="0" b="0"/>
+      </a:lnRef>
+      <a:fillRef idx="1">
+        <a:scrgbClr r="0" g="0" b="0"/>
+      </a:fillRef>
+      <a:effectRef idx="0">
+        <a:scrgbClr r="0" g="0" b="0"/>
+      </a:effectRef>
+      <a:fontRef idx="minor">
+        <a:schemeClr val="lt1"/>
+      </a:fontRef>
+    </dgm:style>
+  </dgm:styleLbl>
+  <dgm:styleLbl name="asst3">
+    <dgm:scene3d>
+      <a:camera prst="orthographicFront"/>
+      <a:lightRig rig="threePt" dir="t"/>
+    </dgm:scene3d>
+    <dgm:sp3d/>
+    <dgm:txPr/>
+    <dgm:style>
+      <a:lnRef idx="2">
+        <a:scrgbClr r="0" g="0" b="0"/>
+      </a:lnRef>
+      <a:fillRef idx="1">
+        <a:scrgbClr r="0" g="0" b="0"/>
+      </a:fillRef>
+      <a:effectRef idx="0">
+        <a:scrgbClr r="0" g="0" b="0"/>
+      </a:effectRef>
+      <a:fontRef idx="minor">
+        <a:schemeClr val="lt1"/>
+      </a:fontRef>
+    </dgm:style>
+  </dgm:styleLbl>
+  <dgm:styleLbl name="asst4">
+    <dgm:scene3d>
+      <a:camera prst="orthographicFront"/>
+      <a:lightRig rig="threePt" dir="t"/>
+    </dgm:scene3d>
+    <dgm:sp3d/>
+    <dgm:txPr/>
+    <dgm:style>
+      <a:lnRef idx="2">
+        <a:scrgbClr r="0" g="0" b="0"/>
+      </a:lnRef>
+      <a:fillRef idx="1">
+        <a:scrgbClr r="0" g="0" b="0"/>
+      </a:fillRef>
+      <a:effectRef idx="0">
+        <a:scrgbClr r="0" g="0" b="0"/>
+      </a:effectRef>
+      <a:fontRef idx="minor">
+        <a:schemeClr val="lt1"/>
+      </a:fontRef>
+    </dgm:style>
+  </dgm:styleLbl>
+  <dgm:styleLbl name="parChTrans2D1">
+    <dgm:scene3d>
+      <a:camera prst="orthographicFront"/>
+      <a:lightRig rig="threePt" dir="t"/>
+    </dgm:scene3d>
+    <dgm:sp3d/>
+    <dgm:txPr/>
+    <dgm:style>
+      <a:lnRef idx="2">
+        <a:scrgbClr r="0" g="0" b="0"/>
+      </a:lnRef>
+      <a:fillRef idx="1">
+        <a:scrgbClr r="0" g="0" b="0"/>
+      </a:fillRef>
+      <a:effectRef idx="0">
+        <a:scrgbClr r="0" g="0" b="0"/>
+      </a:effectRef>
+      <a:fontRef idx="minor">
+        <a:schemeClr val="lt1"/>
+      </a:fontRef>
+    </dgm:style>
+  </dgm:styleLbl>
+  <dgm:styleLbl name="parChTrans2D2">
+    <dgm:scene3d>
+      <a:camera prst="orthographicFront"/>
+      <a:lightRig rig="threePt" dir="t"/>
+    </dgm:scene3d>
+    <dgm:sp3d/>
+    <dgm:txPr/>
+    <dgm:style>
+      <a:lnRef idx="2">
+        <a:scrgbClr r="0" g="0" b="0"/>
+      </a:lnRef>
+      <a:fillRef idx="1">
+        <a:scrgbClr r="0" g="0" b="0"/>
+      </a:fillRef>
+      <a:effectRef idx="0">
+        <a:scrgbClr r="0" g="0" b="0"/>
+      </a:effectRef>
+      <a:fontRef idx="minor">
+        <a:schemeClr val="lt1"/>
+      </a:fontRef>
+    </dgm:style>
+  </dgm:styleLbl>
+  <dgm:styleLbl name="parChTrans2D3">
+    <dgm:scene3d>
+      <a:camera prst="orthographicFront"/>
+      <a:lightRig rig="threePt" dir="t"/>
+    </dgm:scene3d>
+    <dgm:sp3d/>
+    <dgm:txPr/>
+    <dgm:style>
+      <a:lnRef idx="2">
+        <a:scrgbClr r="0" g="0" b="0"/>
+      </a:lnRef>
+      <a:fillRef idx="1">
+        <a:scrgbClr r="0" g="0" b="0"/>
+      </a:fillRef>
+      <a:effectRef idx="0">
+        <a:scrgbClr r="0" g="0" b="0"/>
+      </a:effectRef>
+      <a:fontRef idx="minor">
+        <a:schemeClr val="lt1"/>
+      </a:fontRef>
+    </dgm:style>
+  </dgm:styleLbl>
+  <dgm:styleLbl name="parChTrans2D4">
+    <dgm:scene3d>
+      <a:camera prst="orthographicFront"/>
+      <a:lightRig rig="threePt" dir="t"/>
+    </dgm:scene3d>
+    <dgm:sp3d/>
+    <dgm:txPr/>
+    <dgm:style>
+      <a:lnRef idx="2">
+        <a:scrgbClr r="0" g="0" b="0"/>
+      </a:lnRef>
+      <a:fillRef idx="1">
+        <a:scrgbClr r="0" g="0" b="0"/>
+      </a:fillRef>
+      <a:effectRef idx="0">
+        <a:scrgbClr r="0" g="0" b="0"/>
+      </a:effectRef>
+      <a:fontRef idx="minor">
+        <a:schemeClr val="lt1"/>
+      </a:fontRef>
+    </dgm:style>
+  </dgm:styleLbl>
+  <dgm:styleLbl name="parChTrans1D1">
+    <dgm:scene3d>
+      <a:camera prst="orthographicFront"/>
+      <a:lightRig rig="threePt" dir="t"/>
+    </dgm:scene3d>
+    <dgm:sp3d/>
+    <dgm:txPr/>
+    <dgm:style>
+      <a:lnRef idx="2">
+        <a:scrgbClr r="0" g="0" b="0"/>
+      </a:lnRef>
+      <a:fillRef idx="0">
+        <a:scrgbClr r="0" g="0" b="0"/>
+      </a:fillRef>
+      <a:effectRef idx="0">
+        <a:scrgbClr r="0" g="0" b="0"/>
+      </a:effectRef>
+      <a:fontRef idx="minor"/>
+    </dgm:style>
+  </dgm:styleLbl>
+  <dgm:styleLbl name="parChTrans1D2">
+    <dgm:scene3d>
+      <a:camera prst="orthographicFront"/>
+      <a:lightRig rig="threePt" dir="t"/>
+    </dgm:scene3d>
+    <dgm:sp3d/>
+    <dgm:txPr/>
+    <dgm:style>
+      <a:lnRef idx="2">
+        <a:scrgbClr r="0" g="0" b="0"/>
+      </a:lnRef>
+      <a:fillRef idx="0">
+        <a:scrgbClr r="0" g="0" b="0"/>
+      </a:fillRef>
+      <a:effectRef idx="0">
+        <a:scrgbClr r="0" g="0" b="0"/>
+      </a:effectRef>
+      <a:fontRef idx="minor"/>
+    </dgm:style>
+  </dgm:styleLbl>
+  <dgm:styleLbl name="parChTrans1D3">
+    <dgm:scene3d>
+      <a:camera prst="orthographicFront"/>
+      <a:lightRig rig="threePt" dir="t"/>
+    </dgm:scene3d>
+    <dgm:sp3d/>
+    <dgm:txPr/>
+    <dgm:style>
+      <a:lnRef idx="2">
+        <a:scrgbClr r="0" g="0" b="0"/>
+      </a:lnRef>
+      <a:fillRef idx="0">
+        <a:scrgbClr r="0" g="0" b="0"/>
+      </a:fillRef>
+      <a:effectRef idx="0">
+        <a:scrgbClr r="0" g="0" b="0"/>
+      </a:effectRef>
+      <a:fontRef idx="minor"/>
+    </dgm:style>
+  </dgm:styleLbl>
+  <dgm:styleLbl name="parChTrans1D4">
+    <dgm:scene3d>
+      <a:camera prst="orthographicFront"/>
+      <a:lightRig rig="threePt" dir="t"/>
+    </dgm:scene3d>
+    <dgm:sp3d/>
+    <dgm:txPr/>
+    <dgm:style>
+      <a:lnRef idx="2">
+        <a:scrgbClr r="0" g="0" b="0"/>
+      </a:lnRef>
+      <a:fillRef idx="0">
+        <a:scrgbClr r="0" g="0" b="0"/>
+      </a:fillRef>
+      <a:effectRef idx="0">
+        <a:scrgbClr r="0" g="0" b="0"/>
+      </a:effectRef>
+      <a:fontRef idx="minor"/>
+    </dgm:style>
+  </dgm:styleLbl>
+  <dgm:styleLbl name="fgAcc1">
+    <dgm:scene3d>
+      <a:camera prst="orthographicFront"/>
+      <a:lightRig rig="threePt" dir="t"/>
+    </dgm:scene3d>
+    <dgm:sp3d/>
+    <dgm:txPr/>
+    <dgm:style>
+      <a:lnRef idx="2">
+        <a:scrgbClr r="0" g="0" b="0"/>
+      </a:lnRef>
+      <a:fillRef idx="1">
+        <a:scrgbClr r="0" g="0" b="0"/>
+      </a:fillRef>
+      <a:effectRef idx="0">
+        <a:scrgbClr r="0" g="0" b="0"/>
+      </a:effectRef>
+      <a:fontRef idx="minor"/>
+    </dgm:style>
+  </dgm:styleLbl>
+  <dgm:styleLbl name="conFgAcc1">
+    <dgm:scene3d>
+      <a:camera prst="orthographicFront"/>
+      <a:lightRig rig="threePt" dir="t"/>
+    </dgm:scene3d>
+    <dgm:sp3d/>
+    <dgm:txPr/>
+    <dgm:style>
+      <a:lnRef idx="2">
+        <a:scrgbClr r="0" g="0" b="0"/>
+      </a:lnRef>
+      <a:fillRef idx="1">
+        <a:scrgbClr r="0" g="0" b="0"/>
+      </a:fillRef>
+      <a:effectRef idx="0">
+        <a:scrgbClr r="0" g="0" b="0"/>
+      </a:effectRef>
+      <a:fontRef idx="minor"/>
+    </dgm:style>
+  </dgm:styleLbl>
+  <dgm:styleLbl name="alignAcc1">
+    <dgm:scene3d>
+      <a:camera prst="orthographicFront"/>
+      <a:lightRig rig="threePt" dir="t"/>
+    </dgm:scene3d>
+    <dgm:sp3d/>
+    <dgm:txPr/>
+    <dgm:style>
+      <a:lnRef idx="2">
+        <a:scrgbClr r="0" g="0" b="0"/>
+      </a:lnRef>
+      <a:fillRef idx="1">
+        <a:scrgbClr r="0" g="0" b="0"/>
+      </a:fillRef>
+      <a:effectRef idx="0">
+        <a:scrgbClr r="0" g="0" b="0"/>
+      </a:effectRef>
+      <a:fontRef idx="minor"/>
+    </dgm:style>
+  </dgm:styleLbl>
+  <dgm:styleLbl name="trAlignAcc1">
+    <dgm:scene3d>
+      <a:camera prst="orthographicFront"/>
+      <a:lightRig rig="threePt" dir="t"/>
+    </dgm:scene3d>
+    <dgm:sp3d/>
+    <dgm:txPr/>
+    <dgm:style>
+      <a:lnRef idx="1">
+        <a:scrgbClr r="0" g="0" b="0"/>
+      </a:lnRef>
+      <a:fillRef idx="1">
+        <a:scrgbClr r="0" g="0" b="0"/>
+      </a:fillRef>
+      <a:effectRef idx="0">
+        <a:scrgbClr r="0" g="0" b="0"/>
+      </a:effectRef>
+      <a:fontRef idx="minor"/>
+    </dgm:style>
+  </dgm:styleLbl>
+  <dgm:styleLbl name="bgAcc1">
+    <dgm:scene3d>
+      <a:camera prst="orthographicFront"/>
+      <a:lightRig rig="threePt" dir="t"/>
+    </dgm:scene3d>
+    <dgm:sp3d/>
+    <dgm:txPr/>
+    <dgm:style>
+      <a:lnRef idx="2">
+        <a:scrgbClr r="0" g="0" b="0"/>
+      </a:lnRef>
+      <a:fillRef idx="1">
+        <a:scrgbClr r="0" g="0" b="0"/>
+      </a:fillRef>
+      <a:effectRef idx="0">
+        <a:scrgbClr r="0" g="0" b="0"/>
+      </a:effectRef>
+      <a:fontRef idx="minor"/>
+    </dgm:style>
+  </dgm:styleLbl>
+  <dgm:styleLbl name="solidFgAcc1">
+    <dgm:scene3d>
+      <a:camera prst="orthographicFront"/>
+      <a:lightRig rig="threePt" dir="t"/>
+    </dgm:scene3d>
+    <dgm:sp3d/>
+    <dgm:txPr/>
+    <dgm:style>
+      <a:lnRef idx="2">
+        <a:scrgbClr r="0" g="0" b="0"/>
+      </a:lnRef>
+      <a:fillRef idx="1">
+        <a:scrgbClr r="0" g="0" b="0"/>
+      </a:fillRef>
+      <a:effectRef idx="0">
+        <a:scrgbClr r="0" g="0" b="0"/>
+      </a:effectRef>
+      <a:fontRef idx="minor"/>
+    </dgm:style>
+  </dgm:styleLbl>
+  <dgm:styleLbl name="solidAlignAcc1">
+    <dgm:scene3d>
+      <a:camera prst="orthographicFront"/>
+      <a:lightRig rig="threePt" dir="t"/>
+    </dgm:scene3d>
+    <dgm:sp3d/>
+    <dgm:txPr/>
+    <dgm:style>
+      <a:lnRef idx="2">
+        <a:scrgbClr r="0" g="0" b="0"/>
+      </a:lnRef>
+      <a:fillRef idx="1">
+        <a:scrgbClr r="0" g="0" b="0"/>
+      </a:fillRef>
+      <a:effectRef idx="0">
+        <a:scrgbClr r="0" g="0" b="0"/>
+      </a:effectRef>
+      <a:fontRef idx="minor"/>
+    </dgm:style>
+  </dgm:styleLbl>
+  <dgm:styleLbl name="solidBgAcc1">
+    <dgm:scene3d>
+      <a:camera prst="orthographicFront"/>
+      <a:lightRig rig="threePt" dir="t"/>
+    </dgm:scene3d>
+    <dgm:sp3d/>
+    <dgm:txPr/>
+    <dgm:style>
+      <a:lnRef idx="2">
+        <a:scrgbClr r="0" g="0" b="0"/>
+      </a:lnRef>
+      <a:fillRef idx="1">
+        <a:scrgbClr r="0" g="0" b="0"/>
+      </a:fillRef>
+      <a:effectRef idx="0">
+        <a:scrgbClr r="0" g="0" b="0"/>
+      </a:effectRef>
+      <a:fontRef idx="minor"/>
+    </dgm:style>
+  </dgm:styleLbl>
+  <dgm:styleLbl name="fgAccFollowNode1">
+    <dgm:scene3d>
+      <a:camera prst="orthographicFront"/>
+      <a:lightRig rig="threePt" dir="t"/>
+    </dgm:scene3d>
+    <dgm:sp3d/>
+    <dgm:txPr/>
+    <dgm:style>
+      <a:lnRef idx="2">
+        <a:scrgbClr r="0" g="0" b="0"/>
+      </a:lnRef>
+      <a:fillRef idx="1">
+        <a:scrgbClr r="0" g="0" b="0"/>
+      </a:fillRef>
+      <a:effectRef idx="0">
+        <a:scrgbClr r="0" g="0" b="0"/>
+      </a:effectRef>
+      <a:fontRef idx="minor"/>
+    </dgm:style>
+  </dgm:styleLbl>
+  <dgm:styleLbl name="alignAccFollowNode1">
+    <dgm:scene3d>
+      <a:camera prst="orthographicFront"/>
+      <a:lightRig rig="threePt" dir="t"/>
+    </dgm:scene3d>
+    <dgm:sp3d/>
+    <dgm:txPr/>
+    <dgm:style>
+      <a:lnRef idx="2">
+        <a:scrgbClr r="0" g="0" b="0"/>
+      </a:lnRef>
+      <a:fillRef idx="1">
+        <a:scrgbClr r="0" g="0" b="0"/>
+      </a:fillRef>
+      <a:effectRef idx="0">
+        <a:scrgbClr r="0" g="0" b="0"/>
+      </a:effectRef>
+      <a:fontRef idx="minor"/>
+    </dgm:style>
+  </dgm:styleLbl>
+  <dgm:styleLbl name="bgAccFollowNode1">
+    <dgm:scene3d>
+      <a:camera prst="orthographicFront"/>
+      <a:lightRig rig="threePt" dir="t"/>
+    </dgm:scene3d>
+    <dgm:sp3d/>
+    <dgm:txPr/>
+    <dgm:style>
+      <a:lnRef idx="2">
+        <a:scrgbClr r="0" g="0" b="0"/>
+      </a:lnRef>
+      <a:fillRef idx="1">
+        <a:scrgbClr r="0" g="0" b="0"/>
+      </a:fillRef>
+      <a:effectRef idx="0">
+        <a:scrgbClr r="0" g="0" b="0"/>
+      </a:effectRef>
+      <a:fontRef idx="minor"/>
+    </dgm:style>
+  </dgm:styleLbl>
+  <dgm:styleLbl name="fgAcc0">
+    <dgm:scene3d>
+      <a:camera prst="orthographicFront"/>
+      <a:lightRig rig="threePt" dir="t"/>
+    </dgm:scene3d>
+    <dgm:sp3d/>
+    <dgm:txPr/>
+    <dgm:style>
+      <a:lnRef idx="2">
+        <a:scrgbClr r="0" g="0" b="0"/>
+      </a:lnRef>
+      <a:fillRef idx="1">
+        <a:scrgbClr r="0" g="0" b="0"/>
+      </a:fillRef>
+      <a:effectRef idx="0">
+        <a:scrgbClr r="0" g="0" b="0"/>
+      </a:effectRef>
+      <a:fontRef idx="minor"/>
+    </dgm:style>
+  </dgm:styleLbl>
+  <dgm:styleLbl name="fgAcc2">
+    <dgm:scene3d>
+      <a:camera prst="orthographicFront"/>
+      <a:lightRig rig="threePt" dir="t"/>
+    </dgm:scene3d>
+    <dgm:sp3d/>
+    <dgm:txPr/>
+    <dgm:style>
+      <a:lnRef idx="2">
+        <a:scrgbClr r="0" g="0" b="0"/>
+      </a:lnRef>
+      <a:fillRef idx="1">
+        <a:scrgbClr r="0" g="0" b="0"/>
+      </a:fillRef>
+      <a:effectRef idx="0">
+        <a:scrgbClr r="0" g="0" b="0"/>
+      </a:effectRef>
+      <a:fontRef idx="minor"/>
+    </dgm:style>
+  </dgm:styleLbl>
+  <dgm:styleLbl name="fgAcc3">
+    <dgm:scene3d>
+      <a:camera prst="orthographicFront"/>
+      <a:lightRig rig="threePt" dir="t"/>
+    </dgm:scene3d>
+    <dgm:sp3d/>
+    <dgm:txPr/>
+    <dgm:style>
+      <a:lnRef idx="2">
+        <a:scrgbClr r="0" g="0" b="0"/>
+      </a:lnRef>
+      <a:fillRef idx="1">
+        <a:scrgbClr r="0" g="0" b="0"/>
+      </a:fillRef>
+      <a:effectRef idx="0">
+        <a:scrgbClr r="0" g="0" b="0"/>
+      </a:effectRef>
+      <a:fontRef idx="minor"/>
+    </dgm:style>
+  </dgm:styleLbl>
+  <dgm:styleLbl name="fgAcc4">
+    <dgm:scene3d>
+      <a:camera prst="orthographicFront"/>
+      <a:lightRig rig="threePt" dir="t"/>
+    </dgm:scene3d>
+    <dgm:sp3d/>
+    <dgm:txPr/>
+    <dgm:style>
+      <a:lnRef idx="2">
+        <a:scrgbClr r="0" g="0" b="0"/>
+      </a:lnRef>
+      <a:fillRef idx="1">
+        <a:scrgbClr r="0" g="0" b="0"/>
+      </a:fillRef>
+      <a:effectRef idx="0">
+        <a:scrgbClr r="0" g="0" b="0"/>
+      </a:effectRef>
+      <a:fontRef idx="minor"/>
+    </dgm:style>
+  </dgm:styleLbl>
+  <dgm:styleLbl name="bgShp">
+    <dgm:scene3d>
+      <a:camera prst="orthographicFront"/>
+      <a:lightRig rig="threePt" dir="t"/>
+    </dgm:scene3d>
+    <dgm:sp3d/>
+    <dgm:txPr/>
+    <dgm:style>
+      <a:lnRef idx="0">
+        <a:scrgbClr r="0" g="0" b="0"/>
+      </a:lnRef>
+      <a:fillRef idx="1">
+        <a:scrgbClr r="0" g="0" b="0"/>
+      </a:fillRef>
+      <a:effectRef idx="0">
+        <a:scrgbClr r="0" g="0" b="0"/>
+      </a:effectRef>
+      <a:fontRef idx="minor"/>
+    </dgm:style>
+  </dgm:styleLbl>
+  <dgm:styleLbl name="dkBgShp">
+    <dgm:scene3d>
+      <a:camera prst="orthographicFront"/>
+      <a:lightRig rig="threePt" dir="t"/>
+    </dgm:scene3d>
+    <dgm:sp3d/>
+    <dgm:txPr/>
+    <dgm:style>
+      <a:lnRef idx="0">
+        <a:scrgbClr r="0" g="0" b="0"/>
+      </a:lnRef>
+      <a:fillRef idx="1">
+        <a:scrgbClr r="0" g="0" b="0"/>
+      </a:fillRef>
+      <a:effectRef idx="0">
+        <a:scrgbClr r="0" g="0" b="0"/>
+      </a:effectRef>
+      <a:fontRef idx="minor"/>
+    </dgm:style>
+  </dgm:styleLbl>
+  <dgm:styleLbl name="trBgShp">
+    <dgm:scene3d>
+      <a:camera prst="orthographicFront"/>
+      <a:lightRig rig="threePt" dir="t"/>
+    </dgm:scene3d>
+    <dgm:sp3d/>
+    <dgm:txPr/>
+    <dgm:style>
+      <a:lnRef idx="0">
+        <a:scrgbClr r="0" g="0" b="0"/>
+      </a:lnRef>
+      <a:fillRef idx="1">
+        <a:scrgbClr r="0" g="0" b="0"/>
+      </a:fillRef>
+      <a:effectRef idx="0">
+        <a:scrgbClr r="0" g="0" b="0"/>
+      </a:effectRef>
+      <a:fontRef idx="minor"/>
+    </dgm:style>
+  </dgm:styleLbl>
+  <dgm:styleLbl name="fgShp">
+    <dgm:scene3d>
+      <a:camera prst="orthographicFront"/>
+      <a:lightRig rig="threePt" dir="t"/>
+    </dgm:scene3d>
+    <dgm:sp3d/>
+    <dgm:txPr/>
+    <dgm:style>
+      <a:lnRef idx="2">
+        <a:scrgbClr r="0" g="0" b="0"/>
+      </a:lnRef>
+      <a:fillRef idx="1">
+        <a:scrgbClr r="0" g="0" b="0"/>
+      </a:fillRef>
+      <a:effectRef idx="0">
+        <a:scrgbClr r="0" g="0" b="0"/>
+      </a:effectRef>
+      <a:fontRef idx="minor"/>
+    </dgm:style>
+  </dgm:styleLbl>
+  <dgm:styleLbl name="revTx">
+    <dgm:scene3d>
+      <a:camera prst="orthographicFront"/>
+      <a:lightRig rig="threePt" dir="t"/>
+    </dgm:scene3d>
+    <dgm:sp3d/>
+    <dgm:txPr/>
+    <dgm:style>
+      <a:lnRef idx="0">
+        <a:scrgbClr r="0" g="0" b="0"/>
+      </a:lnRef>
+      <a:fillRef idx="0">
+        <a:scrgbClr r="0" g="0" b="0"/>
+      </a:fillRef>
+      <a:effectRef idx="0">
+        <a:scrgbClr r="0" g="0" b="0"/>
+      </a:effectRef>
+      <a:fontRef idx="minor"/>
+    </dgm:style>
+  </dgm:styleLbl>
+</dgm:styleDef>
 </file>
 
 <file path=ppt/slideLayouts/slideLayout1.xml><?xml version="1.0" encoding="utf-8"?>
@@ -304,7 +3266,7 @@
             <a:fld id="{B61BEF0D-F0BB-DE4B-95CE-6DB70DBA9567}" type="datetimeFigureOut">
               <a:rPr lang="en-US" dirty="0"/>
               <a:pPr/>
-              <a:t>9/14/2022</a:t>
+              <a:t>9/15/2022</a:t>
             </a:fld>
             <a:endParaRPr lang="en-US" dirty="0"/>
           </a:p>
@@ -737,7 +3699,7 @@
             <a:fld id="{B61BEF0D-F0BB-DE4B-95CE-6DB70DBA9567}" type="datetimeFigureOut">
               <a:rPr lang="en-US" dirty="0"/>
               <a:pPr/>
-              <a:t>9/14/2022</a:t>
+              <a:t>9/15/2022</a:t>
             </a:fld>
             <a:endParaRPr lang="en-US" dirty="0"/>
           </a:p>
@@ -984,7 +3946,7 @@
             <a:fld id="{B61BEF0D-F0BB-DE4B-95CE-6DB70DBA9567}" type="datetimeFigureOut">
               <a:rPr lang="en-US" dirty="0"/>
               <a:pPr/>
-              <a:t>9/14/2022</a:t>
+              <a:t>9/15/2022</a:t>
             </a:fld>
             <a:endParaRPr lang="en-US" dirty="0"/>
           </a:p>
@@ -1289,7 +4251,7 @@
             <a:fld id="{B61BEF0D-F0BB-DE4B-95CE-6DB70DBA9567}" type="datetimeFigureOut">
               <a:rPr lang="en-US" dirty="0"/>
               <a:pPr/>
-              <a:t>9/14/2022</a:t>
+              <a:t>9/15/2022</a:t>
             </a:fld>
             <a:endParaRPr lang="en-US" dirty="0"/>
           </a:p>
@@ -1604,7 +4566,7 @@
             <a:fld id="{B61BEF0D-F0BB-DE4B-95CE-6DB70DBA9567}" type="datetimeFigureOut">
               <a:rPr lang="en-US" dirty="0"/>
               <a:pPr/>
-              <a:t>9/14/2022</a:t>
+              <a:t>9/15/2022</a:t>
             </a:fld>
             <a:endParaRPr lang="en-US" dirty="0"/>
           </a:p>
@@ -1903,7 +4865,7 @@
             <a:fld id="{B61BEF0D-F0BB-DE4B-95CE-6DB70DBA9567}" type="datetimeFigureOut">
               <a:rPr lang="en-US" dirty="0"/>
               <a:pPr/>
-              <a:t>9/14/2022</a:t>
+              <a:t>9/15/2022</a:t>
             </a:fld>
             <a:endParaRPr lang="en-US" dirty="0"/>
           </a:p>
@@ -2267,7 +5229,7 @@
             <a:fld id="{B61BEF0D-F0BB-DE4B-95CE-6DB70DBA9567}" type="datetimeFigureOut">
               <a:rPr lang="en-US" dirty="0"/>
               <a:pPr/>
-              <a:t>9/14/2022</a:t>
+              <a:t>9/15/2022</a:t>
             </a:fld>
             <a:endParaRPr lang="en-US" dirty="0"/>
           </a:p>
@@ -2438,7 +5400,7 @@
             <a:fld id="{B61BEF0D-F0BB-DE4B-95CE-6DB70DBA9567}" type="datetimeFigureOut">
               <a:rPr lang="en-US" dirty="0"/>
               <a:pPr/>
-              <a:t>9/14/2022</a:t>
+              <a:t>9/15/2022</a:t>
             </a:fld>
             <a:endParaRPr lang="en-US" dirty="0"/>
           </a:p>
@@ -2615,7 +5577,7 @@
             <a:fld id="{B61BEF0D-F0BB-DE4B-95CE-6DB70DBA9567}" type="datetimeFigureOut">
               <a:rPr lang="en-US" dirty="0"/>
               <a:pPr/>
-              <a:t>9/14/2022</a:t>
+              <a:t>9/15/2022</a:t>
             </a:fld>
             <a:endParaRPr lang="en-US" dirty="0"/>
           </a:p>
@@ -2782,7 +5744,7 @@
             <a:fld id="{B61BEF0D-F0BB-DE4B-95CE-6DB70DBA9567}" type="datetimeFigureOut">
               <a:rPr lang="en-US" dirty="0"/>
               <a:pPr/>
-              <a:t>9/14/2022</a:t>
+              <a:t>9/15/2022</a:t>
             </a:fld>
             <a:endParaRPr lang="en-US" dirty="0"/>
           </a:p>
@@ -3029,7 +5991,7 @@
             <a:fld id="{B61BEF0D-F0BB-DE4B-95CE-6DB70DBA9567}" type="datetimeFigureOut">
               <a:rPr lang="en-US" dirty="0"/>
               <a:pPr/>
-              <a:t>9/14/2022</a:t>
+              <a:t>9/15/2022</a:t>
             </a:fld>
             <a:endParaRPr lang="en-US" dirty="0"/>
           </a:p>
@@ -3262,7 +6224,7 @@
             <a:fld id="{B61BEF0D-F0BB-DE4B-95CE-6DB70DBA9567}" type="datetimeFigureOut">
               <a:rPr lang="en-US" dirty="0"/>
               <a:pPr/>
-              <a:t>9/14/2022</a:t>
+              <a:t>9/15/2022</a:t>
             </a:fld>
             <a:endParaRPr lang="en-US" dirty="0"/>
           </a:p>
@@ -3641,7 +6603,7 @@
             <a:fld id="{B61BEF0D-F0BB-DE4B-95CE-6DB70DBA9567}" type="datetimeFigureOut">
               <a:rPr lang="en-US" dirty="0"/>
               <a:pPr/>
-              <a:t>9/14/2022</a:t>
+              <a:t>9/15/2022</a:t>
             </a:fld>
             <a:endParaRPr lang="en-US" dirty="0"/>
           </a:p>
@@ -3756,7 +6718,7 @@
             <a:fld id="{B61BEF0D-F0BB-DE4B-95CE-6DB70DBA9567}" type="datetimeFigureOut">
               <a:rPr lang="en-US" dirty="0"/>
               <a:pPr/>
-              <a:t>9/14/2022</a:t>
+              <a:t>9/15/2022</a:t>
             </a:fld>
             <a:endParaRPr lang="en-US" dirty="0"/>
           </a:p>
@@ -3848,7 +6810,7 @@
             <a:fld id="{B61BEF0D-F0BB-DE4B-95CE-6DB70DBA9567}" type="datetimeFigureOut">
               <a:rPr lang="en-US" dirty="0"/>
               <a:pPr/>
-              <a:t>9/14/2022</a:t>
+              <a:t>9/15/2022</a:t>
             </a:fld>
             <a:endParaRPr lang="en-US" dirty="0"/>
           </a:p>
@@ -4100,7 +7062,7 @@
             <a:fld id="{B61BEF0D-F0BB-DE4B-95CE-6DB70DBA9567}" type="datetimeFigureOut">
               <a:rPr lang="en-US" dirty="0"/>
               <a:pPr/>
-              <a:t>9/14/2022</a:t>
+              <a:t>9/15/2022</a:t>
             </a:fld>
             <a:endParaRPr lang="en-US" dirty="0"/>
           </a:p>
@@ -4380,7 +7342,7 @@
             <a:fld id="{B61BEF0D-F0BB-DE4B-95CE-6DB70DBA9567}" type="datetimeFigureOut">
               <a:rPr lang="en-US" dirty="0"/>
               <a:pPr/>
-              <a:t>9/14/2022</a:t>
+              <a:t>9/15/2022</a:t>
             </a:fld>
             <a:endParaRPr lang="en-US" dirty="0"/>
           </a:p>
@@ -4783,7 +7745,7 @@
             <a:fld id="{B61BEF0D-F0BB-DE4B-95CE-6DB70DBA9567}" type="datetimeFigureOut">
               <a:rPr lang="en-US" dirty="0"/>
               <a:pPr/>
-              <a:t>9/14/2022</a:t>
+              <a:t>9/15/2022</a:t>
             </a:fld>
             <a:endParaRPr lang="en-US" dirty="0"/>
           </a:p>
@@ -5354,11 +8316,20 @@
             <p:ph type="subTitle" idx="1"/>
           </p:nvPr>
         </p:nvSpPr>
-        <p:spPr/>
+        <p:spPr>
+          <a:xfrm>
+            <a:off x="8514801" y="6395875"/>
+            <a:ext cx="3677199" cy="462126"/>
+          </a:xfrm>
+        </p:spPr>
         <p:txBody>
           <a:bodyPr/>
           <a:lstStyle/>
           <a:p>
+            <a:r>
+              <a:rPr lang="hu-HU" dirty="0" smtClean="0"/>
+              <a:t>Készítette: Jelencsity Miklós</a:t>
+            </a:r>
             <a:endParaRPr lang="hu-HU" dirty="0"/>
           </a:p>
         </p:txBody>
@@ -5373,6 +8344,13 @@
   <p:clrMapOvr>
     <a:masterClrMapping/>
   </p:clrMapOvr>
+  <p:timing>
+    <p:tnLst>
+      <p:par>
+        <p:cTn id="1" dur="indefinite" restart="never" nodeType="tmRoot"/>
+      </p:par>
+    </p:tnLst>
+  </p:timing>
 </p:sld>
 </file>
 
@@ -5405,7 +8383,7 @@
         </p:nvSpPr>
         <p:spPr>
           <a:xfrm>
-            <a:off x="684212" y="5229610"/>
+            <a:off x="623454" y="4065828"/>
             <a:ext cx="8534400" cy="1507067"/>
           </a:xfrm>
         </p:spPr>
@@ -5441,29 +8419,45 @@
         </p:nvSpPr>
         <p:spPr>
           <a:xfrm>
-            <a:off x="684212" y="1871831"/>
-            <a:ext cx="8534400" cy="2429236"/>
+            <a:off x="623454" y="1704109"/>
+            <a:ext cx="9252065" cy="4039986"/>
           </a:xfrm>
         </p:spPr>
         <p:txBody>
-          <a:bodyPr/>
+          <a:bodyPr>
+            <a:normAutofit/>
+          </a:bodyPr>
           <a:lstStyle/>
           <a:p>
             <a:r>
-              <a:rPr lang="hu-HU" dirty="0"/>
+              <a:rPr lang="hu-HU" sz="2400" dirty="0"/>
               <a:t>Projektmenedzsment </a:t>
             </a:r>
             <a:r>
-              <a:rPr lang="hu-HU" dirty="0" smtClean="0"/>
+              <a:rPr lang="hu-HU" sz="2400" dirty="0" smtClean="0"/>
               <a:t>módszertan</a:t>
             </a:r>
-            <a:endParaRPr lang="hu-HU" dirty="0"/>
-          </a:p>
-          <a:p>
-            <a:r>
-              <a:rPr lang="hu-HU" dirty="0" smtClean="0"/>
-              <a:t>Legelső körben alkalmazott</a:t>
-            </a:r>
+            <a:endParaRPr lang="hu-HU" sz="2400" dirty="0"/>
+          </a:p>
+          <a:p>
+            <a:r>
+              <a:rPr lang="hu-HU" sz="2400" dirty="0" smtClean="0"/>
+              <a:t>Legelső körben </a:t>
+            </a:r>
+            <a:r>
+              <a:rPr lang="hu-HU" sz="2400" dirty="0" smtClean="0"/>
+              <a:t>alkalmazott</a:t>
+            </a:r>
+          </a:p>
+          <a:p>
+            <a:r>
+              <a:rPr lang="hu-HU" sz="2400" dirty="0" smtClean="0"/>
+              <a:t>Projekt erre épül</a:t>
+            </a:r>
+            <a:endParaRPr lang="hu-HU" sz="2400" dirty="0" smtClean="0"/>
+          </a:p>
+          <a:p>
+            <a:endParaRPr lang="hu-HU" dirty="0" smtClean="0"/>
           </a:p>
           <a:p>
             <a:endParaRPr lang="hu-HU" dirty="0"/>
@@ -5483,6 +8477,13 @@
   <p:clrMapOvr>
     <a:masterClrMapping/>
   </p:clrMapOvr>
+  <p:timing>
+    <p:tnLst>
+      <p:par>
+        <p:cTn id="1" dur="indefinite" restart="never" nodeType="tmRoot"/>
+      </p:par>
+    </p:tnLst>
+  </p:timing>
 </p:sld>
 </file>
 
@@ -5503,44 +8504,31 @@
           <a:chExt cx="0" cy="0"/>
         </a:xfrm>
       </p:grpSpPr>
-      <p:sp>
-        <p:nvSpPr>
-          <p:cNvPr id="2" name="Cím 1"/>
-          <p:cNvSpPr>
-            <a:spLocks noGrp="1"/>
-          </p:cNvSpPr>
-          <p:nvPr>
-            <p:ph type="title"/>
-          </p:nvPr>
-        </p:nvSpPr>
-        <p:spPr/>
-        <p:txBody>
-          <a:bodyPr/>
-          <a:lstStyle/>
-          <a:p>
-            <a:endParaRPr lang="hu-HU"/>
-          </a:p>
-        </p:txBody>
-      </p:sp>
-      <p:sp>
-        <p:nvSpPr>
-          <p:cNvPr id="3" name="Tartalom helye 2"/>
-          <p:cNvSpPr>
-            <a:spLocks noGrp="1"/>
-          </p:cNvSpPr>
+      <p:graphicFrame>
+        <p:nvGraphicFramePr>
+          <p:cNvPr id="4" name="Tartalom helye 3"/>
+          <p:cNvGraphicFramePr>
+            <a:graphicFrameLocks noGrp="1"/>
+          </p:cNvGraphicFramePr>
           <p:nvPr>
             <p:ph idx="1"/>
-          </p:nvPr>
-        </p:nvSpPr>
-        <p:spPr/>
-        <p:txBody>
-          <a:bodyPr/>
-          <a:lstStyle/>
-          <a:p>
-            <a:endParaRPr lang="hu-HU" dirty="0" smtClean="0"/>
-          </a:p>
-        </p:txBody>
-      </p:sp>
+            <p:extLst>
+              <p:ext uri="{D42A27DB-BD31-4B8C-83A1-F6EECF244321}">
+                <p14:modId xmlns:p14="http://schemas.microsoft.com/office/powerpoint/2010/main" val="809445982"/>
+              </p:ext>
+            </p:extLst>
+          </p:nvPr>
+        </p:nvGraphicFramePr>
+        <p:xfrm>
+          <a:off x="631767" y="332509"/>
+          <a:ext cx="11380124" cy="5968538"/>
+        </p:xfrm>
+        <a:graphic>
+          <a:graphicData uri="http://schemas.openxmlformats.org/drawingml/2006/diagram">
+            <dgm:relIds xmlns:dgm="http://schemas.openxmlformats.org/drawingml/2006/diagram" xmlns:r="http://schemas.openxmlformats.org/officeDocument/2006/relationships" r:dm="rId2" r:lo="rId3" r:qs="rId4" r:cs="rId5"/>
+          </a:graphicData>
+        </a:graphic>
+      </p:graphicFrame>
     </p:spTree>
     <p:extLst>
       <p:ext uri="{BB962C8B-B14F-4D97-AF65-F5344CB8AC3E}">
@@ -5551,6 +8539,13 @@
   <p:clrMapOvr>
     <a:masterClrMapping/>
   </p:clrMapOvr>
+  <p:timing>
+    <p:tnLst>
+      <p:par>
+        <p:cTn id="1" dur="indefinite" restart="never" nodeType="tmRoot"/>
+      </p:par>
+    </p:tnLst>
+  </p:timing>
 </p:sld>
 </file>
 
@@ -5583,42 +8578,79 @@
         </p:nvSpPr>
         <p:spPr/>
         <p:txBody>
+          <a:bodyPr>
+            <a:normAutofit/>
+          </a:bodyPr>
+          <a:lstStyle/>
+          <a:p>
+            <a:r>
+              <a:rPr lang="hu-HU" sz="4000" b="1" dirty="0" smtClean="0"/>
+              <a:t>Előnyök</a:t>
+            </a:r>
+            <a:endParaRPr lang="hu-HU" sz="4000" b="1" dirty="0"/>
+          </a:p>
+        </p:txBody>
+      </p:sp>
+      <p:sp>
+        <p:nvSpPr>
+          <p:cNvPr id="3" name="Tartalom helye 2"/>
+          <p:cNvSpPr>
+            <a:spLocks noGrp="1"/>
+          </p:cNvSpPr>
+          <p:nvPr>
+            <p:ph idx="1"/>
+          </p:nvPr>
+        </p:nvSpPr>
+        <p:spPr/>
+        <p:txBody>
           <a:bodyPr/>
           <a:lstStyle/>
           <a:p>
-            <a:endParaRPr lang="hu-HU"/>
-          </a:p>
-        </p:txBody>
-      </p:sp>
-      <p:sp>
-        <p:nvSpPr>
-          <p:cNvPr id="3" name="Tartalom helye 2"/>
-          <p:cNvSpPr>
-            <a:spLocks noGrp="1"/>
-          </p:cNvSpPr>
-          <p:nvPr>
-            <p:ph idx="1"/>
-          </p:nvPr>
-        </p:nvSpPr>
-        <p:spPr/>
-        <p:txBody>
-          <a:bodyPr/>
-          <a:lstStyle/>
-          <a:p>
-            <a:endParaRPr lang="hu-HU"/>
+            <a:r>
+              <a:rPr lang="hu-HU" dirty="0" smtClean="0"/>
+              <a:t>Könnyen érthető</a:t>
+            </a:r>
+          </a:p>
+          <a:p>
+            <a:r>
+              <a:rPr lang="hu-HU" dirty="0" smtClean="0"/>
+              <a:t>Változások nélkül könnyen tervezhető</a:t>
+            </a:r>
+          </a:p>
+          <a:p>
+            <a:r>
+              <a:rPr lang="hu-HU" dirty="0" smtClean="0"/>
+              <a:t>Könnyű dokumentálás</a:t>
+            </a:r>
+          </a:p>
+          <a:p>
+            <a:endParaRPr lang="hu-HU" dirty="0" smtClean="0"/>
+          </a:p>
+          <a:p>
+            <a:endParaRPr lang="hu-HU" dirty="0" smtClean="0"/>
+          </a:p>
+          <a:p>
+            <a:endParaRPr lang="hu-HU" dirty="0"/>
           </a:p>
         </p:txBody>
       </p:sp>
     </p:spTree>
     <p:extLst>
       <p:ext uri="{BB962C8B-B14F-4D97-AF65-F5344CB8AC3E}">
-        <p14:creationId xmlns:p14="http://schemas.microsoft.com/office/powerpoint/2010/main" val="2900543144"/>
+        <p14:creationId xmlns:p14="http://schemas.microsoft.com/office/powerpoint/2010/main" val="3212085731"/>
       </p:ext>
     </p:extLst>
   </p:cSld>
   <p:clrMapOvr>
     <a:masterClrMapping/>
   </p:clrMapOvr>
+  <p:timing>
+    <p:tnLst>
+      <p:par>
+        <p:cTn id="1" dur="indefinite" restart="never" nodeType="tmRoot"/>
+      </p:par>
+    </p:tnLst>
+  </p:timing>
 </p:sld>
 </file>
 
@@ -5654,7 +8686,11 @@
           <a:bodyPr/>
           <a:lstStyle/>
           <a:p>
-            <a:endParaRPr lang="hu-HU"/>
+            <a:r>
+              <a:rPr lang="hu-HU" b="1" dirty="0" smtClean="0"/>
+              <a:t>Hátrányok</a:t>
+            </a:r>
+            <a:endParaRPr lang="hu-HU" b="1" dirty="0"/>
           </a:p>
         </p:txBody>
       </p:sp>
@@ -5673,20 +8709,39 @@
           <a:bodyPr/>
           <a:lstStyle/>
           <a:p>
-            <a:endParaRPr lang="hu-HU"/>
+            <a:r>
+              <a:rPr lang="hu-HU" dirty="0" smtClean="0"/>
+              <a:t>Tervezetlen változások</a:t>
+            </a:r>
+          </a:p>
+          <a:p>
+            <a:r>
+              <a:rPr lang="hu-HU" dirty="0" smtClean="0"/>
+              <a:t>Megrendelő számára láhatóság</a:t>
+            </a:r>
+          </a:p>
+          <a:p>
+            <a:endParaRPr lang="hu-HU" dirty="0"/>
           </a:p>
         </p:txBody>
       </p:sp>
     </p:spTree>
     <p:extLst>
       <p:ext uri="{BB962C8B-B14F-4D97-AF65-F5344CB8AC3E}">
-        <p14:creationId xmlns:p14="http://schemas.microsoft.com/office/powerpoint/2010/main" val="3212085731"/>
+        <p14:creationId xmlns:p14="http://schemas.microsoft.com/office/powerpoint/2010/main" val="4279283449"/>
       </p:ext>
     </p:extLst>
   </p:cSld>
   <p:clrMapOvr>
     <a:masterClrMapping/>
   </p:clrMapOvr>
+  <p:timing>
+    <p:tnLst>
+      <p:par>
+        <p:cTn id="1" dur="indefinite" restart="never" nodeType="tmRoot"/>
+      </p:par>
+    </p:tnLst>
+  </p:timing>
 </p:sld>
 </file>
 
@@ -5722,7 +8777,11 @@
           <a:bodyPr/>
           <a:lstStyle/>
           <a:p>
-            <a:endParaRPr lang="hu-HU"/>
+            <a:r>
+              <a:rPr lang="hu-HU" dirty="0" smtClean="0"/>
+              <a:t>Mikor érdemes alkalmazni?</a:t>
+            </a:r>
+            <a:endParaRPr lang="hu-HU" dirty="0"/>
           </a:p>
         </p:txBody>
       </p:sp>
@@ -5741,14 +8800,111 @@
           <a:bodyPr/>
           <a:lstStyle/>
           <a:p>
-            <a:endParaRPr lang="hu-HU"/>
+            <a:r>
+              <a:rPr lang="hu-HU" dirty="0" smtClean="0"/>
+              <a:t>Meghatározott követelmény</a:t>
+            </a:r>
+          </a:p>
+          <a:p>
+            <a:r>
+              <a:rPr lang="hu-HU" dirty="0" smtClean="0"/>
+              <a:t>Egyértelmű elvárások</a:t>
+            </a:r>
+          </a:p>
+          <a:p>
+            <a:r>
+              <a:rPr lang="hu-HU" dirty="0" smtClean="0"/>
+              <a:t>Változás nélküli projekt</a:t>
+            </a:r>
+          </a:p>
+          <a:p>
+            <a:r>
+              <a:rPr lang="hu-HU" dirty="0" smtClean="0"/>
+              <a:t>Folyamatos visszacsatolás elhanyagolható</a:t>
+            </a:r>
+            <a:endParaRPr lang="hu-HU" dirty="0"/>
           </a:p>
         </p:txBody>
       </p:sp>
     </p:spTree>
     <p:extLst>
       <p:ext uri="{BB962C8B-B14F-4D97-AF65-F5344CB8AC3E}">
-        <p14:creationId xmlns:p14="http://schemas.microsoft.com/office/powerpoint/2010/main" val="2939879486"/>
+        <p14:creationId xmlns:p14="http://schemas.microsoft.com/office/powerpoint/2010/main" val="2900543144"/>
+      </p:ext>
+    </p:extLst>
+  </p:cSld>
+  <p:clrMapOvr>
+    <a:masterClrMapping/>
+  </p:clrMapOvr>
+  <p:timing>
+    <p:tnLst>
+      <p:par>
+        <p:cTn id="1" dur="indefinite" restart="never" nodeType="tmRoot"/>
+      </p:par>
+    </p:tnLst>
+  </p:timing>
+</p:sld>
+</file>
+
+<file path=ppt/slides/slide7.xml><?xml version="1.0" encoding="utf-8"?>
+<p:sld xmlns:a="http://schemas.openxmlformats.org/drawingml/2006/main" xmlns:r="http://schemas.openxmlformats.org/officeDocument/2006/relationships" xmlns:p="http://schemas.openxmlformats.org/presentationml/2006/main">
+  <p:cSld>
+    <p:spTree>
+      <p:nvGrpSpPr>
+        <p:cNvPr id="1" name=""/>
+        <p:cNvGrpSpPr/>
+        <p:nvPr/>
+      </p:nvGrpSpPr>
+      <p:grpSpPr>
+        <a:xfrm>
+          <a:off x="0" y="0"/>
+          <a:ext cx="0" cy="0"/>
+          <a:chOff x="0" y="0"/>
+          <a:chExt cx="0" cy="0"/>
+        </a:xfrm>
+      </p:grpSpPr>
+      <p:sp>
+        <p:nvSpPr>
+          <p:cNvPr id="2" name="Cím 1"/>
+          <p:cNvSpPr>
+            <a:spLocks noGrp="1"/>
+          </p:cNvSpPr>
+          <p:nvPr>
+            <p:ph type="title"/>
+          </p:nvPr>
+        </p:nvSpPr>
+        <p:spPr/>
+        <p:txBody>
+          <a:bodyPr/>
+          <a:lstStyle/>
+          <a:p>
+            <a:endParaRPr lang="hu-HU" dirty="0"/>
+          </a:p>
+        </p:txBody>
+      </p:sp>
+      <p:sp>
+        <p:nvSpPr>
+          <p:cNvPr id="3" name="Tartalom helye 2"/>
+          <p:cNvSpPr>
+            <a:spLocks noGrp="1"/>
+          </p:cNvSpPr>
+          <p:nvPr>
+            <p:ph idx="1"/>
+          </p:nvPr>
+        </p:nvSpPr>
+        <p:spPr/>
+        <p:txBody>
+          <a:bodyPr/>
+          <a:lstStyle/>
+          <a:p>
+            <a:endParaRPr lang="hu-HU" dirty="0"/>
+          </a:p>
+        </p:txBody>
+      </p:sp>
+    </p:spTree>
+    <p:extLst>
+      <p:ext uri="{BB962C8B-B14F-4D97-AF65-F5344CB8AC3E}">
+        <p14:creationId xmlns:p14="http://schemas.microsoft.com/office/powerpoint/2010/main" val="2620417152"/>
       </p:ext>
     </p:extLst>
   </p:cSld>

</xml_diff>